<commit_message>
changes to modified DPD task
</commit_message>
<xml_diff>
--- a/src/mod_DPD_task/stimuli/instructions/instructionsDPD.pptx
+++ b/src/mod_DPD_task/stimuli/instructions/instructionsDPD.pptx
@@ -263,7 +263,7 @@
           <a:p>
             <a:fld id="{712DDF4E-9AD6-4EE5-9343-468C572CABA6}" type="datetimeFigureOut">
               <a:rPr lang="fr-FR" smtClean="0"/>
-              <a:t>19/07/2020</a:t>
+              <a:t>22/07/2020</a:t>
             </a:fld>
             <a:endParaRPr lang="fr-FR" dirty="0"/>
           </a:p>
@@ -305,7 +305,7 @@
           <a:p>
             <a:fld id="{6496F53C-98F8-4EF1-8F44-F193611899A2}" type="slidenum">
               <a:rPr lang="fr-FR" smtClean="0"/>
-              <a:t>‹N°›</a:t>
+              <a:t>‹Nº›</a:t>
             </a:fld>
             <a:endParaRPr lang="fr-FR" dirty="0"/>
           </a:p>
@@ -431,7 +431,7 @@
           <a:p>
             <a:fld id="{712DDF4E-9AD6-4EE5-9343-468C572CABA6}" type="datetimeFigureOut">
               <a:rPr lang="fr-FR" smtClean="0"/>
-              <a:t>19/07/2020</a:t>
+              <a:t>22/07/2020</a:t>
             </a:fld>
             <a:endParaRPr lang="fr-FR" dirty="0"/>
           </a:p>
@@ -473,7 +473,7 @@
           <a:p>
             <a:fld id="{6496F53C-98F8-4EF1-8F44-F193611899A2}" type="slidenum">
               <a:rPr lang="fr-FR" smtClean="0"/>
-              <a:t>‹N°›</a:t>
+              <a:t>‹Nº›</a:t>
             </a:fld>
             <a:endParaRPr lang="fr-FR" dirty="0"/>
           </a:p>
@@ -609,7 +609,7 @@
           <a:p>
             <a:fld id="{712DDF4E-9AD6-4EE5-9343-468C572CABA6}" type="datetimeFigureOut">
               <a:rPr lang="fr-FR" smtClean="0"/>
-              <a:t>19/07/2020</a:t>
+              <a:t>22/07/2020</a:t>
             </a:fld>
             <a:endParaRPr lang="fr-FR" dirty="0"/>
           </a:p>
@@ -651,7 +651,7 @@
           <a:p>
             <a:fld id="{6496F53C-98F8-4EF1-8F44-F193611899A2}" type="slidenum">
               <a:rPr lang="fr-FR" smtClean="0"/>
-              <a:t>‹N°›</a:t>
+              <a:t>‹Nº›</a:t>
             </a:fld>
             <a:endParaRPr lang="fr-FR" dirty="0"/>
           </a:p>
@@ -777,7 +777,7 @@
           <a:p>
             <a:fld id="{712DDF4E-9AD6-4EE5-9343-468C572CABA6}" type="datetimeFigureOut">
               <a:rPr lang="fr-FR" smtClean="0"/>
-              <a:t>19/07/2020</a:t>
+              <a:t>22/07/2020</a:t>
             </a:fld>
             <a:endParaRPr lang="fr-FR" dirty="0"/>
           </a:p>
@@ -819,7 +819,7 @@
           <a:p>
             <a:fld id="{6496F53C-98F8-4EF1-8F44-F193611899A2}" type="slidenum">
               <a:rPr lang="fr-FR" smtClean="0"/>
-              <a:t>‹N°›</a:t>
+              <a:t>‹Nº›</a:t>
             </a:fld>
             <a:endParaRPr lang="fr-FR" dirty="0"/>
           </a:p>
@@ -1022,7 +1022,7 @@
           <a:p>
             <a:fld id="{712DDF4E-9AD6-4EE5-9343-468C572CABA6}" type="datetimeFigureOut">
               <a:rPr lang="fr-FR" smtClean="0"/>
-              <a:t>19/07/2020</a:t>
+              <a:t>22/07/2020</a:t>
             </a:fld>
             <a:endParaRPr lang="fr-FR" dirty="0"/>
           </a:p>
@@ -1064,7 +1064,7 @@
           <a:p>
             <a:fld id="{6496F53C-98F8-4EF1-8F44-F193611899A2}" type="slidenum">
               <a:rPr lang="fr-FR" smtClean="0"/>
-              <a:t>‹N°›</a:t>
+              <a:t>‹Nº›</a:t>
             </a:fld>
             <a:endParaRPr lang="fr-FR" dirty="0"/>
           </a:p>
@@ -1251,7 +1251,7 @@
           <a:p>
             <a:fld id="{712DDF4E-9AD6-4EE5-9343-468C572CABA6}" type="datetimeFigureOut">
               <a:rPr lang="fr-FR" smtClean="0"/>
-              <a:t>19/07/2020</a:t>
+              <a:t>22/07/2020</a:t>
             </a:fld>
             <a:endParaRPr lang="fr-FR" dirty="0"/>
           </a:p>
@@ -1293,7 +1293,7 @@
           <a:p>
             <a:fld id="{6496F53C-98F8-4EF1-8F44-F193611899A2}" type="slidenum">
               <a:rPr lang="fr-FR" smtClean="0"/>
-              <a:t>‹N°›</a:t>
+              <a:t>‹Nº›</a:t>
             </a:fld>
             <a:endParaRPr lang="fr-FR" dirty="0"/>
           </a:p>
@@ -1615,7 +1615,7 @@
           <a:p>
             <a:fld id="{712DDF4E-9AD6-4EE5-9343-468C572CABA6}" type="datetimeFigureOut">
               <a:rPr lang="fr-FR" smtClean="0"/>
-              <a:t>19/07/2020</a:t>
+              <a:t>22/07/2020</a:t>
             </a:fld>
             <a:endParaRPr lang="fr-FR" dirty="0"/>
           </a:p>
@@ -1657,7 +1657,7 @@
           <a:p>
             <a:fld id="{6496F53C-98F8-4EF1-8F44-F193611899A2}" type="slidenum">
               <a:rPr lang="fr-FR" smtClean="0"/>
-              <a:t>‹N°›</a:t>
+              <a:t>‹Nº›</a:t>
             </a:fld>
             <a:endParaRPr lang="fr-FR" dirty="0"/>
           </a:p>
@@ -1732,7 +1732,7 @@
           <a:p>
             <a:fld id="{712DDF4E-9AD6-4EE5-9343-468C572CABA6}" type="datetimeFigureOut">
               <a:rPr lang="fr-FR" smtClean="0"/>
-              <a:t>19/07/2020</a:t>
+              <a:t>22/07/2020</a:t>
             </a:fld>
             <a:endParaRPr lang="fr-FR" dirty="0"/>
           </a:p>
@@ -1774,7 +1774,7 @@
           <a:p>
             <a:fld id="{6496F53C-98F8-4EF1-8F44-F193611899A2}" type="slidenum">
               <a:rPr lang="fr-FR" smtClean="0"/>
-              <a:t>‹N°›</a:t>
+              <a:t>‹Nº›</a:t>
             </a:fld>
             <a:endParaRPr lang="fr-FR" dirty="0"/>
           </a:p>
@@ -1827,7 +1827,7 @@
           <a:p>
             <a:fld id="{712DDF4E-9AD6-4EE5-9343-468C572CABA6}" type="datetimeFigureOut">
               <a:rPr lang="fr-FR" smtClean="0"/>
-              <a:t>19/07/2020</a:t>
+              <a:t>22/07/2020</a:t>
             </a:fld>
             <a:endParaRPr lang="fr-FR" dirty="0"/>
           </a:p>
@@ -1869,7 +1869,7 @@
           <a:p>
             <a:fld id="{6496F53C-98F8-4EF1-8F44-F193611899A2}" type="slidenum">
               <a:rPr lang="fr-FR" smtClean="0"/>
-              <a:t>‹N°›</a:t>
+              <a:t>‹Nº›</a:t>
             </a:fld>
             <a:endParaRPr lang="fr-FR" dirty="0"/>
           </a:p>
@@ -2102,7 +2102,7 @@
           <a:p>
             <a:fld id="{712DDF4E-9AD6-4EE5-9343-468C572CABA6}" type="datetimeFigureOut">
               <a:rPr lang="fr-FR" smtClean="0"/>
-              <a:t>19/07/2020</a:t>
+              <a:t>22/07/2020</a:t>
             </a:fld>
             <a:endParaRPr lang="fr-FR" dirty="0"/>
           </a:p>
@@ -2144,7 +2144,7 @@
           <a:p>
             <a:fld id="{6496F53C-98F8-4EF1-8F44-F193611899A2}" type="slidenum">
               <a:rPr lang="fr-FR" smtClean="0"/>
-              <a:t>‹N°›</a:t>
+              <a:t>‹Nº›</a:t>
             </a:fld>
             <a:endParaRPr lang="fr-FR" dirty="0"/>
           </a:p>
@@ -2354,7 +2354,7 @@
           <a:p>
             <a:fld id="{712DDF4E-9AD6-4EE5-9343-468C572CABA6}" type="datetimeFigureOut">
               <a:rPr lang="fr-FR" smtClean="0"/>
-              <a:t>19/07/2020</a:t>
+              <a:t>22/07/2020</a:t>
             </a:fld>
             <a:endParaRPr lang="fr-FR" dirty="0"/>
           </a:p>
@@ -2396,7 +2396,7 @@
           <a:p>
             <a:fld id="{6496F53C-98F8-4EF1-8F44-F193611899A2}" type="slidenum">
               <a:rPr lang="fr-FR" smtClean="0"/>
-              <a:t>‹N°›</a:t>
+              <a:t>‹Nº›</a:t>
             </a:fld>
             <a:endParaRPr lang="fr-FR" dirty="0"/>
           </a:p>
@@ -2565,7 +2565,7 @@
           <a:p>
             <a:fld id="{712DDF4E-9AD6-4EE5-9343-468C572CABA6}" type="datetimeFigureOut">
               <a:rPr lang="fr-FR" smtClean="0"/>
-              <a:t>19/07/2020</a:t>
+              <a:t>22/07/2020</a:t>
             </a:fld>
             <a:endParaRPr lang="fr-FR" dirty="0"/>
           </a:p>
@@ -2643,7 +2643,7 @@
           <a:p>
             <a:fld id="{6496F53C-98F8-4EF1-8F44-F193611899A2}" type="slidenum">
               <a:rPr lang="fr-FR" smtClean="0"/>
-              <a:t>‹N°›</a:t>
+              <a:t>‹Nº›</a:t>
             </a:fld>
             <a:endParaRPr lang="fr-FR" dirty="0"/>
           </a:p>
@@ -2994,7 +2994,7 @@
           <a:p>
             <a:pPr algn="ctr"/>
             <a:r>
-              <a:rPr lang="fr-FR" sz="2400" b="1" dirty="0" smtClean="0">
+              <a:rPr lang="fr-FR" sz="2400" b="1" dirty="0">
                 <a:solidFill>
                   <a:srgbClr val="0070C0"/>
                 </a:solidFill>
@@ -3005,14 +3005,14 @@
           <a:p>
             <a:pPr algn="ctr"/>
             <a:r>
-              <a:rPr lang="fr-FR" sz="2400" b="1" dirty="0" smtClean="0">
+              <a:rPr lang="fr-FR" sz="2400" b="1" dirty="0">
                 <a:solidFill>
                   <a:srgbClr val="0070C0"/>
                 </a:solidFill>
               </a:rPr>
               <a:t>INSTRUCTIONS</a:t>
             </a:r>
-            <a:endParaRPr lang="en-GB" sz="2400" b="1" dirty="0" smtClean="0">
+            <a:endParaRPr lang="en-GB" sz="2400" b="1" dirty="0">
               <a:solidFill>
                 <a:srgbClr val="0070C0"/>
               </a:solidFill>
@@ -3055,38 +3055,9 @@
               </a:lnSpc>
             </a:pPr>
             <a:r>
-              <a:rPr lang="en-GB" sz="2400" dirty="0" err="1" smtClean="0"/>
-              <a:t>Veuillez</a:t>
-            </a:r>
-            <a:r>
-              <a:rPr lang="en-GB" sz="2400" dirty="0" smtClean="0"/>
-              <a:t> lire </a:t>
-            </a:r>
-            <a:r>
-              <a:rPr lang="en-GB" sz="2400" dirty="0" err="1" smtClean="0"/>
-              <a:t>attentivement</a:t>
-            </a:r>
-            <a:r>
-              <a:rPr lang="en-GB" sz="2400" dirty="0" smtClean="0"/>
-              <a:t> les instructions qui </a:t>
-            </a:r>
-            <a:r>
-              <a:rPr lang="en-GB" sz="2400" dirty="0" err="1" smtClean="0"/>
-              <a:t>vont</a:t>
-            </a:r>
-            <a:r>
-              <a:rPr lang="en-GB" sz="2400" dirty="0" smtClean="0"/>
-              <a:t> </a:t>
-            </a:r>
-            <a:r>
-              <a:rPr lang="en-GB" sz="2400" dirty="0" err="1" smtClean="0"/>
-              <a:t>suivre</a:t>
-            </a:r>
-            <a:r>
-              <a:rPr lang="en-GB" sz="2400" dirty="0" smtClean="0"/>
-              <a:t>.</a:t>
-            </a:r>
-            <a:endParaRPr lang="en-GB" sz="2400" dirty="0"/>
+              <a:rPr lang="fr-FR" sz="2400" dirty="0"/>
+              <a:t>Veuillez lire attentivement les instructions qui vont suivre.</a:t>
+            </a:r>
           </a:p>
           <a:p>
             <a:pPr algn="ctr">
@@ -3095,54 +3066,9 @@
               </a:lnSpc>
             </a:pPr>
             <a:r>
-              <a:rPr lang="en-GB" sz="2400" dirty="0" err="1" smtClean="0"/>
-              <a:t>Appuyez</a:t>
-            </a:r>
-            <a:r>
-              <a:rPr lang="en-GB" sz="2400" dirty="0" smtClean="0"/>
-              <a:t> </a:t>
-            </a:r>
-            <a:r>
-              <a:rPr lang="en-GB" sz="2400" dirty="0"/>
-              <a:t>sur </a:t>
-            </a:r>
-            <a:r>
-              <a:rPr lang="fr-FR" sz="2400" dirty="0"/>
-              <a:t>« </a:t>
-            </a:r>
-            <a:r>
-              <a:rPr lang="en-GB" sz="2400" dirty="0"/>
-              <a:t>la </a:t>
-            </a:r>
-            <a:r>
-              <a:rPr lang="en-GB" sz="2400" dirty="0" err="1" smtClean="0"/>
-              <a:t>flèche</a:t>
-            </a:r>
-            <a:r>
-              <a:rPr lang="en-GB" sz="2400" dirty="0" smtClean="0"/>
-              <a:t> </a:t>
-            </a:r>
-            <a:r>
-              <a:rPr lang="en-GB" sz="2400" dirty="0"/>
-              <a:t>de </a:t>
-            </a:r>
-            <a:r>
-              <a:rPr lang="en-GB" sz="2400" dirty="0" err="1" smtClean="0"/>
-              <a:t>droite</a:t>
-            </a:r>
-            <a:r>
-              <a:rPr lang="fr-FR" sz="2400" dirty="0"/>
-              <a:t> »</a:t>
-            </a:r>
-            <a:r>
-              <a:rPr lang="en-GB" sz="2400" dirty="0"/>
-              <a:t> pour continuer et lire la </a:t>
-            </a:r>
-            <a:r>
-              <a:rPr lang="en-GB" sz="2400" dirty="0" smtClean="0"/>
-              <a:t>suite.</a:t>
-            </a:r>
-            <a:endParaRPr lang="en-GB" sz="2400" dirty="0"/>
+              <a:rPr lang="fr-FR" sz="2400" dirty="0"/>
+              <a:t>Appuyez sur « la flèche de droite » pour continuer et lire la suite.</a:t>
+            </a:r>
           </a:p>
           <a:p>
             <a:pPr algn="ctr">
@@ -3151,66 +3077,9 @@
               </a:lnSpc>
             </a:pPr>
             <a:r>
-              <a:rPr lang="en-GB" sz="2400" dirty="0" err="1"/>
-              <a:t>Appuyez</a:t>
-            </a:r>
-            <a:r>
-              <a:rPr lang="en-GB" sz="2400" dirty="0"/>
-              <a:t> sur </a:t>
-            </a:r>
-            <a:r>
-              <a:rPr lang="fr-FR" sz="2400" dirty="0"/>
-              <a:t>« </a:t>
-            </a:r>
-            <a:r>
-              <a:rPr lang="en-GB" sz="2400" dirty="0"/>
-              <a:t>la </a:t>
-            </a:r>
-            <a:r>
-              <a:rPr lang="en-GB" sz="2400" dirty="0" err="1" smtClean="0"/>
-              <a:t>flèche</a:t>
-            </a:r>
-            <a:r>
-              <a:rPr lang="en-GB" sz="2400" dirty="0" smtClean="0"/>
-              <a:t> </a:t>
-            </a:r>
-            <a:r>
-              <a:rPr lang="en-GB" sz="2400" dirty="0"/>
-              <a:t>de gauche </a:t>
-            </a:r>
-            <a:r>
-              <a:rPr lang="fr-FR" sz="2400" dirty="0"/>
-              <a:t>»</a:t>
-            </a:r>
-            <a:r>
-              <a:rPr lang="en-GB" sz="2400" dirty="0"/>
-              <a:t> pour </a:t>
-            </a:r>
-            <a:r>
-              <a:rPr lang="en-GB" sz="2400" dirty="0" err="1"/>
-              <a:t>revenir</a:t>
-            </a:r>
-            <a:r>
-              <a:rPr lang="en-GB" sz="2400" dirty="0"/>
-              <a:t> et lire </a:t>
-            </a:r>
-            <a:r>
-              <a:rPr lang="en-GB" sz="2400" dirty="0" err="1" smtClean="0"/>
-              <a:t>l’instruction</a:t>
-            </a:r>
-            <a:r>
-              <a:rPr lang="en-GB" sz="2400" dirty="0" smtClean="0"/>
-              <a:t> </a:t>
-            </a:r>
-            <a:r>
-              <a:rPr lang="en-GB" sz="2400" dirty="0" err="1" smtClean="0"/>
-              <a:t>précédente</a:t>
-            </a:r>
-            <a:r>
-              <a:rPr lang="en-GB" sz="2400" smtClean="0"/>
-              <a:t>.</a:t>
-            </a:r>
-            <a:endParaRPr lang="fr-FR" sz="2400" dirty="0"/>
+              <a:rPr lang="fr-FR" sz="2400" dirty="0"/>
+              <a:t>Appuyez sur « la flèche de gauche » pour revenir et lire l’instruction précédente.</a:t>
+            </a:r>
           </a:p>
         </p:txBody>
       </p:sp>
@@ -3224,13 +3093,6 @@
   <p:clrMapOvr>
     <a:masterClrMapping/>
   </p:clrMapOvr>
-  <p:timing>
-    <p:tnLst>
-      <p:par>
-        <p:cTn id="1" dur="indefinite" restart="never" nodeType="tmRoot"/>
-      </p:par>
-    </p:tnLst>
-  </p:timing>
 </p:sld>
 </file>
 
@@ -3278,37 +3140,8 @@
             </a:pPr>
             <a:r>
               <a:rPr lang="fr-FR" sz="2400" dirty="0"/>
-              <a:t>Finalement, à la fin de chaque </a:t>
-            </a:r>
-            <a:r>
-              <a:rPr lang="fr-FR" sz="2400" dirty="0" smtClean="0"/>
-              <a:t>phase </a:t>
-            </a:r>
-            <a:r>
-              <a:rPr lang="fr-FR" sz="2400" dirty="0"/>
-              <a:t>de prédiction, </a:t>
-            </a:r>
-            <a:r>
-              <a:rPr lang="fr-FR" sz="2400" dirty="0" smtClean="0"/>
-              <a:t>nous </a:t>
-            </a:r>
-            <a:r>
-              <a:rPr lang="fr-FR" sz="2400" dirty="0"/>
-              <a:t>vous </a:t>
-            </a:r>
-            <a:r>
-              <a:rPr lang="fr-FR" sz="2400" dirty="0" smtClean="0"/>
-              <a:t>demanderons </a:t>
-            </a:r>
-            <a:r>
-              <a:rPr lang="fr-FR" sz="2400" dirty="0"/>
-              <a:t>à quel point vous pensez que l’autre participant(e) est </a:t>
-            </a:r>
-            <a:r>
-              <a:rPr lang="fr-FR" sz="2400" dirty="0" smtClean="0"/>
-              <a:t>prudent(e):</a:t>
-            </a:r>
-            <a:endParaRPr lang="fr-FR" sz="2400" dirty="0"/>
+              <a:t>Finalement, à la fin de chaque phase de prédiction, nous vous demanderons à quel point vous pensez que l’autre participant(e) est prudent(e):</a:t>
+            </a:r>
           </a:p>
         </p:txBody>
       </p:sp>
@@ -3372,7 +3205,7 @@
           <a:p>
             <a:pPr algn="ctr"/>
             <a:r>
-              <a:rPr lang="fr-FR" sz="2400" b="1" dirty="0" smtClean="0">
+              <a:rPr lang="fr-FR" sz="2400" b="1" dirty="0">
                 <a:solidFill>
                   <a:srgbClr val="0070C0"/>
                 </a:solidFill>
@@ -3411,21 +3244,8 @@
             <a:pPr algn="ctr"/>
             <a:r>
               <a:rPr lang="fr-FR" sz="2400" dirty="0"/>
-              <a:t> </a:t>
-            </a:r>
-            <a:r>
-              <a:rPr lang="fr-FR" sz="2400" dirty="0" smtClean="0"/>
-              <a:t>Vous indiquerez votre réponse </a:t>
-            </a:r>
-            <a:r>
-              <a:rPr lang="fr-FR" sz="2400" dirty="0"/>
-              <a:t>en déplaçant le pointeur de la barre de défilement avec la </a:t>
-            </a:r>
-            <a:r>
-              <a:rPr lang="fr-FR" sz="2400" dirty="0" smtClean="0"/>
-              <a:t>souris.</a:t>
-            </a:r>
-            <a:endParaRPr lang="fr-FR" sz="2400" dirty="0"/>
+              <a:t> Vous indiquerez votre réponse en déplaçant le pointeur de la barre de défilement avec la souris.</a:t>
+            </a:r>
           </a:p>
         </p:txBody>
       </p:sp>
@@ -3439,13 +3259,6 @@
   <p:clrMapOvr>
     <a:masterClrMapping/>
   </p:clrMapOvr>
-  <p:timing>
-    <p:tnLst>
-      <p:par>
-        <p:cTn id="1" dur="indefinite" restart="never" nodeType="tmRoot"/>
-      </p:par>
-    </p:tnLst>
-  </p:timing>
 </p:sld>
 </file>
 
@@ -3534,27 +3347,8 @@
           <a:p>
             <a:pPr algn="ctr"/>
             <a:r>
-              <a:rPr lang="en-GB" sz="2400" dirty="0" smtClean="0"/>
-              <a:t>Au total, le test </a:t>
-            </a:r>
-            <a:r>
-              <a:rPr lang="en-GB" sz="2400" dirty="0" err="1" smtClean="0"/>
-              <a:t>comprend</a:t>
-            </a:r>
-            <a:r>
-              <a:rPr lang="en-GB" sz="2400" dirty="0" smtClean="0"/>
-              <a:t> 4 phases de decision, et 3 phases de prediction.</a:t>
-            </a:r>
-          </a:p>
-          <a:p>
-            <a:pPr algn="ctr"/>
-            <a:endParaRPr lang="en-GB" sz="2400" dirty="0"/>
-          </a:p>
-          <a:p>
-            <a:pPr algn="ctr"/>
-            <a:r>
-              <a:rPr lang="fr-FR" sz="2400" dirty="0" smtClean="0"/>
-              <a:t>Chaque phase de décision et/ou prédiction comprend 32 choix risqués.</a:t>
+              <a:rPr lang="fr-FR" sz="2400" dirty="0"/>
+              <a:t>Au total, le test comprends 4 phases de décision, et 3 phases de prédiction.</a:t>
             </a:r>
           </a:p>
           <a:p>
@@ -3564,121 +3358,42 @@
           <a:p>
             <a:pPr algn="ctr"/>
             <a:r>
-              <a:rPr lang="fr-FR" sz="2400" dirty="0" smtClean="0"/>
+              <a:rPr lang="fr-FR" sz="2400" dirty="0"/>
+              <a:t>Chaque phase de décision et/ou prédiction comprend 18 choix risqués.</a:t>
+            </a:r>
+          </a:p>
+          <a:p>
+            <a:pPr algn="ctr"/>
+            <a:endParaRPr lang="fr-FR" sz="2400" dirty="0"/>
+          </a:p>
+          <a:p>
+            <a:pPr algn="ctr"/>
+            <a:r>
+              <a:rPr lang="fr-FR" sz="2400" dirty="0"/>
               <a:t>Un choix risqué impose une décision entre une option « sûre » et une option « risquée ». Dans la phase de décision, il n’y a pas de bonne ou de mauvaise réponse.</a:t>
             </a:r>
-            <a:endParaRPr lang="en-GB" sz="2400" dirty="0" smtClean="0"/>
-          </a:p>
-          <a:p>
-            <a:pPr algn="ctr"/>
-            <a:endParaRPr lang="en-GB" sz="2400" dirty="0"/>
-          </a:p>
-          <a:p>
-            <a:pPr algn="ctr"/>
-            <a:r>
-              <a:rPr lang="en-GB" sz="2400" dirty="0" err="1" smtClean="0"/>
-              <a:t>Relisez</a:t>
-            </a:r>
-            <a:r>
-              <a:rPr lang="en-GB" sz="2400" dirty="0" smtClean="0"/>
-              <a:t> </a:t>
-            </a:r>
-            <a:r>
-              <a:rPr lang="en-GB" sz="2400" dirty="0" err="1" smtClean="0"/>
-              <a:t>ces</a:t>
-            </a:r>
-            <a:r>
-              <a:rPr lang="en-GB" sz="2400" dirty="0" smtClean="0"/>
-              <a:t> instructions </a:t>
-            </a:r>
-            <a:r>
-              <a:rPr lang="en-GB" sz="2400" dirty="0" err="1" smtClean="0"/>
-              <a:t>jusqu’à</a:t>
-            </a:r>
-            <a:r>
-              <a:rPr lang="en-GB" sz="2400" dirty="0" smtClean="0"/>
-              <a:t> </a:t>
-            </a:r>
-            <a:r>
-              <a:rPr lang="en-GB" sz="2400" dirty="0" err="1" smtClean="0"/>
-              <a:t>ce</a:t>
-            </a:r>
-            <a:r>
-              <a:rPr lang="en-GB" sz="2400" dirty="0" smtClean="0"/>
-              <a:t> </a:t>
-            </a:r>
-            <a:r>
-              <a:rPr lang="en-GB" sz="2400" dirty="0" err="1" smtClean="0"/>
-              <a:t>qu’elles</a:t>
-            </a:r>
-            <a:r>
-              <a:rPr lang="en-GB" sz="2400" dirty="0" smtClean="0"/>
-              <a:t> </a:t>
-            </a:r>
-            <a:r>
-              <a:rPr lang="en-GB" sz="2400" dirty="0" err="1" smtClean="0"/>
-              <a:t>soient</a:t>
-            </a:r>
-            <a:r>
-              <a:rPr lang="en-GB" sz="2400" dirty="0" smtClean="0"/>
-              <a:t> </a:t>
-            </a:r>
-            <a:r>
-              <a:rPr lang="en-GB" sz="2400" dirty="0" err="1" smtClean="0"/>
-              <a:t>parfaitement</a:t>
-            </a:r>
-            <a:r>
-              <a:rPr lang="en-GB" sz="2400" dirty="0" smtClean="0"/>
-              <a:t> </a:t>
-            </a:r>
-            <a:r>
-              <a:rPr lang="en-GB" sz="2400" dirty="0" err="1" smtClean="0"/>
-              <a:t>claires</a:t>
-            </a:r>
-            <a:r>
-              <a:rPr lang="en-GB" sz="2400" dirty="0" smtClean="0"/>
-              <a:t>.</a:t>
-            </a:r>
-          </a:p>
-          <a:p>
-            <a:pPr algn="ctr"/>
-            <a:endParaRPr lang="en-GB" sz="2400" dirty="0" smtClean="0"/>
-          </a:p>
-          <a:p>
-            <a:pPr algn="ctr"/>
-            <a:r>
-              <a:rPr lang="en-GB" sz="2400" dirty="0" err="1" smtClean="0"/>
-              <a:t>Vous</a:t>
-            </a:r>
-            <a:r>
-              <a:rPr lang="en-GB" sz="2400" dirty="0" smtClean="0"/>
-              <a:t> </a:t>
-            </a:r>
-            <a:r>
-              <a:rPr lang="en-GB" sz="2400" dirty="0" err="1" smtClean="0"/>
-              <a:t>êtes</a:t>
-            </a:r>
-            <a:r>
-              <a:rPr lang="en-GB" sz="2400" dirty="0" smtClean="0"/>
-              <a:t> prêt(e)? </a:t>
-            </a:r>
-            <a:r>
-              <a:rPr lang="en-GB" sz="2400" dirty="0" err="1" smtClean="0"/>
-              <a:t>Passons</a:t>
-            </a:r>
-            <a:r>
-              <a:rPr lang="en-GB" sz="2400" dirty="0" smtClean="0"/>
-              <a:t> à </a:t>
-            </a:r>
-            <a:r>
-              <a:rPr lang="en-GB" sz="2400" dirty="0" err="1" smtClean="0"/>
-              <a:t>l’entraînement</a:t>
-            </a:r>
-            <a:r>
-              <a:rPr lang="en-GB" sz="2400" dirty="0" smtClean="0"/>
-              <a:t>…</a:t>
-            </a:r>
-            <a:endParaRPr lang="en-GB" sz="2400" dirty="0"/>
+          </a:p>
+          <a:p>
+            <a:pPr algn="ctr"/>
+            <a:endParaRPr lang="fr-FR" sz="2400" dirty="0"/>
+          </a:p>
+          <a:p>
+            <a:pPr algn="ctr"/>
+            <a:r>
+              <a:rPr lang="fr-FR" sz="2400" dirty="0"/>
+              <a:t>Relisez ces instructions jusqu’à ce qu’elles soient parfaitement claires.</a:t>
+            </a:r>
+          </a:p>
+          <a:p>
+            <a:pPr algn="ctr"/>
+            <a:endParaRPr lang="fr-FR" sz="2400" dirty="0"/>
+          </a:p>
+          <a:p>
+            <a:pPr algn="ctr"/>
+            <a:r>
+              <a:rPr lang="fr-FR" sz="2400" dirty="0"/>
+              <a:t>Vous êtes prêt(e)? Passons à l’entraînement…</a:t>
+            </a:r>
           </a:p>
           <a:p>
             <a:pPr algn="ctr"/>
@@ -3696,13 +3411,6 @@
   <p:clrMapOvr>
     <a:masterClrMapping/>
   </p:clrMapOvr>
-  <p:timing>
-    <p:tnLst>
-      <p:par>
-        <p:cTn id="1" dur="indefinite" restart="never" nodeType="tmRoot"/>
-      </p:par>
-    </p:tnLst>
-  </p:timing>
 </p:sld>
 </file>
 
@@ -3838,18 +3546,13 @@
               </a:spcAft>
             </a:pPr>
             <a:r>
-              <a:rPr lang="en-GB" sz="2400" b="1" dirty="0" smtClean="0">
+              <a:rPr lang="en-GB" sz="2400" b="1" dirty="0">
                 <a:solidFill>
                   <a:srgbClr val="0070C0"/>
                 </a:solidFill>
               </a:rPr>
               <a:t>ENTRAÎNEMENT – PHASE DE DÉCISION</a:t>
             </a:r>
-            <a:endParaRPr lang="en-GB" sz="2400" b="1" dirty="0">
-              <a:solidFill>
-                <a:srgbClr val="0070C0"/>
-              </a:solidFill>
-            </a:endParaRPr>
           </a:p>
         </p:txBody>
       </p:sp>
@@ -3927,13 +3630,6 @@
   <p:clrMapOvr>
     <a:masterClrMapping/>
   </p:clrMapOvr>
-  <p:timing>
-    <p:tnLst>
-      <p:par>
-        <p:cTn id="1" dur="indefinite" restart="never" nodeType="tmRoot"/>
-      </p:par>
-    </p:tnLst>
-  </p:timing>
 </p:sld>
 </file>
 
@@ -4069,18 +3765,13 @@
               </a:spcAft>
             </a:pPr>
             <a:r>
-              <a:rPr lang="en-GB" sz="2400" b="1" dirty="0" smtClean="0">
+              <a:rPr lang="en-GB" sz="2400" b="1" dirty="0">
                 <a:solidFill>
                   <a:srgbClr val="0070C0"/>
                 </a:solidFill>
               </a:rPr>
               <a:t>ENTRAÎNEMENT – PHASE DE PRÉDICTION</a:t>
             </a:r>
-            <a:endParaRPr lang="en-GB" sz="2400" b="1" dirty="0">
-              <a:solidFill>
-                <a:srgbClr val="0070C0"/>
-              </a:solidFill>
-            </a:endParaRPr>
           </a:p>
         </p:txBody>
       </p:sp>
@@ -4158,13 +3849,6 @@
   <p:clrMapOvr>
     <a:masterClrMapping/>
   </p:clrMapOvr>
-  <p:timing>
-    <p:tnLst>
-      <p:par>
-        <p:cTn id="1" dur="indefinite" restart="never" nodeType="tmRoot"/>
-      </p:par>
-    </p:tnLst>
-  </p:timing>
 </p:sld>
 </file>
 
@@ -4223,19 +3907,33 @@
               <a:buNone/>
             </a:pPr>
             <a:r>
-              <a:rPr lang="fr-FR" sz="2400" dirty="0" smtClean="0"/>
+              <a:rPr lang="fr-FR" sz="2400" dirty="0"/>
               <a:t>L’entrainement est maintenant terminé. Vous allez maintenant commencer le test. </a:t>
             </a:r>
+          </a:p>
+          <a:p>
+            <a:pPr algn="ctr"/>
             <a:endParaRPr lang="fr-FR" sz="2400" dirty="0"/>
           </a:p>
           <a:p>
-            <a:pPr algn="ctr"/>
+            <a:pPr marL="0" indent="0" algn="ctr">
+              <a:buNone/>
+            </a:pPr>
             <a:endParaRPr lang="fr-FR" sz="2400" dirty="0"/>
           </a:p>
           <a:p>
             <a:pPr marL="0" indent="0" algn="ctr">
               <a:buNone/>
             </a:pPr>
+            <a:r>
+              <a:rPr lang="fr-FR" sz="2400" dirty="0"/>
+              <a:t>Votre performance dans cette phase ne sera pas prise en compte pour votre bonus financier. </a:t>
+            </a:r>
+          </a:p>
+          <a:p>
+            <a:pPr marL="0" indent="0" algn="ctr">
+              <a:buNone/>
+            </a:pPr>
             <a:endParaRPr lang="fr-FR" sz="2400" dirty="0"/>
           </a:p>
           <a:p>
@@ -4244,25 +3942,8 @@
             </a:pPr>
             <a:r>
               <a:rPr lang="fr-FR" sz="2400" dirty="0"/>
-              <a:t>Votre performance dans cette phase ne sera pas prise en compte pour votre bonus financier. </a:t>
-            </a:r>
-            <a:endParaRPr lang="fr-FR" sz="2400" dirty="0" smtClean="0"/>
-          </a:p>
-          <a:p>
-            <a:pPr marL="0" indent="0" algn="ctr">
-              <a:buNone/>
-            </a:pPr>
-            <a:endParaRPr lang="fr-FR" sz="2400" dirty="0"/>
-          </a:p>
-          <a:p>
-            <a:pPr marL="0" indent="0" algn="ctr">
-              <a:buNone/>
-            </a:pPr>
-            <a:r>
-              <a:rPr lang="fr-FR" sz="2400" dirty="0" smtClean="0"/>
               <a:t>Vous êtes prêt(e)?</a:t>
             </a:r>
-            <a:endParaRPr lang="fr-FR" sz="2400" dirty="0"/>
           </a:p>
           <a:p>
             <a:pPr marL="0" indent="0" algn="ctr">
@@ -4318,18 +3999,13 @@
               </a:spcAft>
             </a:pPr>
             <a:r>
-              <a:rPr lang="en-GB" sz="2400" b="1" dirty="0" smtClean="0">
+              <a:rPr lang="en-GB" sz="2400" b="1" dirty="0">
                 <a:solidFill>
                   <a:srgbClr val="0070C0"/>
                 </a:solidFill>
               </a:rPr>
               <a:t>FIN DE L’ENTRAÎNEMENT</a:t>
             </a:r>
-            <a:endParaRPr lang="en-GB" sz="2400" b="1" dirty="0">
-              <a:solidFill>
-                <a:srgbClr val="0070C0"/>
-              </a:solidFill>
-            </a:endParaRPr>
           </a:p>
         </p:txBody>
       </p:sp>
@@ -4407,13 +4083,6 @@
   <p:clrMapOvr>
     <a:masterClrMapping/>
   </p:clrMapOvr>
-  <p:timing>
-    <p:tnLst>
-      <p:par>
-        <p:cTn id="1" dur="indefinite" restart="never" nodeType="tmRoot"/>
-      </p:par>
-    </p:tnLst>
-  </p:timing>
 </p:sld>
 </file>
 
@@ -4472,10 +4141,9 @@
               <a:buNone/>
             </a:pPr>
             <a:r>
-              <a:rPr lang="fr-FR" sz="2400" dirty="0" smtClean="0"/>
+              <a:rPr lang="fr-FR" sz="2400" dirty="0"/>
               <a:t>Nous allons évaluer votre prudence, c’est-à-dire votre tendance à prendre en compte les risques. </a:t>
             </a:r>
-            <a:endParaRPr lang="fr-FR" sz="2400" dirty="0"/>
           </a:p>
           <a:p>
             <a:pPr algn="ctr"/>
@@ -4535,18 +4203,13 @@
               </a:spcAft>
             </a:pPr>
             <a:r>
-              <a:rPr lang="en-GB" sz="2400" b="1" dirty="0" smtClean="0">
+              <a:rPr lang="en-GB" sz="2400" b="1" dirty="0">
                 <a:solidFill>
                   <a:srgbClr val="0070C0"/>
                 </a:solidFill>
               </a:rPr>
               <a:t>PHASE DE DÉCISION</a:t>
             </a:r>
-            <a:endParaRPr lang="en-GB" sz="2400" b="1" dirty="0">
-              <a:solidFill>
-                <a:srgbClr val="0070C0"/>
-              </a:solidFill>
-            </a:endParaRPr>
           </a:p>
         </p:txBody>
       </p:sp>
@@ -4624,13 +4287,6 @@
   <p:clrMapOvr>
     <a:masterClrMapping/>
   </p:clrMapOvr>
-  <p:timing>
-    <p:tnLst>
-      <p:par>
-        <p:cTn id="1" dur="indefinite" restart="never" nodeType="tmRoot"/>
-      </p:par>
-    </p:tnLst>
-  </p:timing>
 </p:sld>
 </file>
 
@@ -4689,10 +4345,9 @@
               <a:buNone/>
             </a:pPr>
             <a:r>
-              <a:rPr lang="fr-FR" sz="2400" dirty="0" smtClean="0"/>
+              <a:rPr lang="fr-FR" sz="2400" dirty="0"/>
               <a:t>Nous allons évaluer votre capacité à évaluer la prudence des autres. </a:t>
             </a:r>
-            <a:endParaRPr lang="fr-FR" sz="2400" dirty="0"/>
           </a:p>
           <a:p>
             <a:pPr algn="ctr"/>
@@ -4752,18 +4407,13 @@
               </a:spcAft>
             </a:pPr>
             <a:r>
-              <a:rPr lang="en-GB" sz="2400" b="1" dirty="0" smtClean="0">
+              <a:rPr lang="en-GB" sz="2400" b="1" dirty="0">
                 <a:solidFill>
                   <a:srgbClr val="0070C0"/>
                 </a:solidFill>
               </a:rPr>
               <a:t>PHASE DE PRÉDICTION</a:t>
             </a:r>
-            <a:endParaRPr lang="en-GB" sz="2400" b="1" dirty="0">
-              <a:solidFill>
-                <a:srgbClr val="0070C0"/>
-              </a:solidFill>
-            </a:endParaRPr>
           </a:p>
         </p:txBody>
       </p:sp>
@@ -4841,13 +4491,6 @@
   <p:clrMapOvr>
     <a:masterClrMapping/>
   </p:clrMapOvr>
-  <p:timing>
-    <p:tnLst>
-      <p:par>
-        <p:cTn id="1" dur="indefinite" restart="never" nodeType="tmRoot"/>
-      </p:par>
-    </p:tnLst>
-  </p:timing>
 </p:sld>
 </file>
 
@@ -4892,20 +4535,8 @@
           <a:p>
             <a:pPr algn="ctr"/>
             <a:r>
-              <a:rPr lang="fr-FR" sz="2400" dirty="0" smtClean="0"/>
-              <a:t>Le test de cognition sociale </a:t>
-            </a:r>
-            <a:r>
-              <a:rPr lang="fr-FR" sz="2400" dirty="0"/>
-              <a:t>est maintenant </a:t>
-            </a:r>
-            <a:r>
-              <a:rPr lang="fr-FR" sz="2400" dirty="0" smtClean="0"/>
-              <a:t>terminé.</a:t>
-            </a:r>
-            <a:r>
-              <a:rPr lang="fr-FR" sz="2400" dirty="0"/>
-              <a:t/>
+              <a:rPr lang="fr-FR" sz="2400" dirty="0"/>
+              <a:t>Le test de cognition sociale est maintenant terminé.</a:t>
             </a:r>
             <a:br>
               <a:rPr lang="fr-FR" sz="2400" dirty="0"/>
@@ -4993,18 +4624,13 @@
               </a:spcAft>
             </a:pPr>
             <a:r>
-              <a:rPr lang="en-GB" sz="2400" b="1" dirty="0" smtClean="0">
+              <a:rPr lang="en-GB" sz="2400" b="1" dirty="0">
                 <a:solidFill>
                   <a:srgbClr val="0070C0"/>
                 </a:solidFill>
               </a:rPr>
               <a:t>FIN DU TEST DE COGNITION SOCIALE</a:t>
             </a:r>
-            <a:endParaRPr lang="en-GB" sz="2400" b="1" dirty="0">
-              <a:solidFill>
-                <a:srgbClr val="0070C0"/>
-              </a:solidFill>
-            </a:endParaRPr>
           </a:p>
         </p:txBody>
       </p:sp>
@@ -5018,13 +4644,6 @@
   <p:clrMapOvr>
     <a:masterClrMapping/>
   </p:clrMapOvr>
-  <p:timing>
-    <p:tnLst>
-      <p:par>
-        <p:cTn id="1" dur="indefinite" restart="never" nodeType="tmRoot"/>
-      </p:par>
-    </p:tnLst>
-  </p:timing>
 </p:sld>
 </file>
 
@@ -5069,7 +4688,7 @@
           <a:p>
             <a:pPr algn="ctr"/>
             <a:r>
-              <a:rPr lang="fr-FR" sz="2400" b="1" dirty="0" smtClean="0">
+              <a:rPr lang="fr-FR" sz="2400" b="1" dirty="0">
                 <a:solidFill>
                   <a:srgbClr val="0070C0"/>
                 </a:solidFill>
@@ -5080,14 +4699,14 @@
           <a:p>
             <a:pPr algn="ctr"/>
             <a:r>
-              <a:rPr lang="fr-FR" sz="2400" b="1" dirty="0" smtClean="0">
+              <a:rPr lang="fr-FR" sz="2400" b="1" dirty="0">
                 <a:solidFill>
                   <a:srgbClr val="0070C0"/>
                 </a:solidFill>
               </a:rPr>
               <a:t>INSTRUCTIONS</a:t>
             </a:r>
-            <a:endParaRPr lang="en-GB" sz="2400" b="1" dirty="0" smtClean="0">
+            <a:endParaRPr lang="en-GB" sz="2400" b="1" dirty="0">
               <a:solidFill>
                 <a:srgbClr val="0070C0"/>
               </a:solidFill>
@@ -5130,38 +4749,9 @@
               </a:lnSpc>
             </a:pPr>
             <a:r>
-              <a:rPr lang="en-GB" sz="2400" dirty="0" err="1" smtClean="0"/>
-              <a:t>Veuillez</a:t>
-            </a:r>
-            <a:r>
-              <a:rPr lang="en-GB" sz="2400" dirty="0" smtClean="0"/>
-              <a:t> lire </a:t>
-            </a:r>
-            <a:r>
-              <a:rPr lang="en-GB" sz="2400" dirty="0" err="1" smtClean="0"/>
-              <a:t>attentivement</a:t>
-            </a:r>
-            <a:r>
-              <a:rPr lang="en-GB" sz="2400" dirty="0" smtClean="0"/>
-              <a:t> les instructions qui </a:t>
-            </a:r>
-            <a:r>
-              <a:rPr lang="en-GB" sz="2400" dirty="0" err="1" smtClean="0"/>
-              <a:t>vont</a:t>
-            </a:r>
-            <a:r>
-              <a:rPr lang="en-GB" sz="2400" dirty="0" smtClean="0"/>
-              <a:t> </a:t>
-            </a:r>
-            <a:r>
-              <a:rPr lang="en-GB" sz="2400" dirty="0" err="1" smtClean="0"/>
-              <a:t>suivre</a:t>
-            </a:r>
-            <a:r>
-              <a:rPr lang="en-GB" sz="2400" dirty="0" smtClean="0"/>
-              <a:t>.</a:t>
-            </a:r>
-            <a:endParaRPr lang="en-GB" sz="2400" dirty="0"/>
+              <a:rPr lang="fr-FR" sz="2400" dirty="0"/>
+              <a:t>Veuillez lire attentivement les instructions qui vont suivre.</a:t>
+            </a:r>
           </a:p>
           <a:p>
             <a:pPr algn="ctr">
@@ -5170,54 +4760,9 @@
               </a:lnSpc>
             </a:pPr>
             <a:r>
-              <a:rPr lang="en-GB" sz="2400" dirty="0" err="1" smtClean="0"/>
-              <a:t>Appuyez</a:t>
-            </a:r>
-            <a:r>
-              <a:rPr lang="en-GB" sz="2400" dirty="0" smtClean="0"/>
-              <a:t> </a:t>
-            </a:r>
-            <a:r>
-              <a:rPr lang="en-GB" sz="2400" dirty="0"/>
-              <a:t>sur </a:t>
-            </a:r>
-            <a:r>
-              <a:rPr lang="fr-FR" sz="2400" dirty="0"/>
-              <a:t>« </a:t>
-            </a:r>
-            <a:r>
-              <a:rPr lang="en-GB" sz="2400" dirty="0"/>
-              <a:t>la </a:t>
-            </a:r>
-            <a:r>
-              <a:rPr lang="en-GB" sz="2400" dirty="0" err="1" smtClean="0"/>
-              <a:t>flèche</a:t>
-            </a:r>
-            <a:r>
-              <a:rPr lang="en-GB" sz="2400" dirty="0" smtClean="0"/>
-              <a:t> </a:t>
-            </a:r>
-            <a:r>
-              <a:rPr lang="en-GB" sz="2400" dirty="0"/>
-              <a:t>de </a:t>
-            </a:r>
-            <a:r>
-              <a:rPr lang="en-GB" sz="2400" dirty="0" err="1" smtClean="0"/>
-              <a:t>droite</a:t>
-            </a:r>
-            <a:r>
-              <a:rPr lang="fr-FR" sz="2400" dirty="0"/>
-              <a:t> »</a:t>
-            </a:r>
-            <a:r>
-              <a:rPr lang="en-GB" sz="2400" dirty="0"/>
-              <a:t> pour continuer et lire la </a:t>
-            </a:r>
-            <a:r>
-              <a:rPr lang="en-GB" sz="2400" dirty="0" smtClean="0"/>
-              <a:t>suite.</a:t>
-            </a:r>
-            <a:endParaRPr lang="en-GB" sz="2400" dirty="0"/>
+              <a:rPr lang="fr-FR" sz="2400" dirty="0"/>
+              <a:t>Appuyez sur « la flèche de droite » pour continuer et lire la suite.</a:t>
+            </a:r>
           </a:p>
           <a:p>
             <a:pPr algn="ctr">
@@ -5226,66 +4771,9 @@
               </a:lnSpc>
             </a:pPr>
             <a:r>
-              <a:rPr lang="en-GB" sz="2400" dirty="0" err="1"/>
-              <a:t>Appuyez</a:t>
-            </a:r>
-            <a:r>
-              <a:rPr lang="en-GB" sz="2400" dirty="0"/>
-              <a:t> sur </a:t>
-            </a:r>
-            <a:r>
-              <a:rPr lang="fr-FR" sz="2400" dirty="0"/>
-              <a:t>« </a:t>
-            </a:r>
-            <a:r>
-              <a:rPr lang="en-GB" sz="2400" dirty="0"/>
-              <a:t>la </a:t>
-            </a:r>
-            <a:r>
-              <a:rPr lang="en-GB" sz="2400" dirty="0" err="1" smtClean="0"/>
-              <a:t>flèche</a:t>
-            </a:r>
-            <a:r>
-              <a:rPr lang="en-GB" sz="2400" dirty="0" smtClean="0"/>
-              <a:t> </a:t>
-            </a:r>
-            <a:r>
-              <a:rPr lang="en-GB" sz="2400" dirty="0"/>
-              <a:t>de gauche </a:t>
-            </a:r>
-            <a:r>
-              <a:rPr lang="fr-FR" sz="2400" dirty="0"/>
-              <a:t>»</a:t>
-            </a:r>
-            <a:r>
-              <a:rPr lang="en-GB" sz="2400" dirty="0"/>
-              <a:t> pour </a:t>
-            </a:r>
-            <a:r>
-              <a:rPr lang="en-GB" sz="2400" dirty="0" err="1"/>
-              <a:t>revenir</a:t>
-            </a:r>
-            <a:r>
-              <a:rPr lang="en-GB" sz="2400" dirty="0"/>
-              <a:t> et lire </a:t>
-            </a:r>
-            <a:r>
-              <a:rPr lang="en-GB" sz="2400" dirty="0" err="1" smtClean="0"/>
-              <a:t>l’instruction</a:t>
-            </a:r>
-            <a:r>
-              <a:rPr lang="en-GB" sz="2400" dirty="0" smtClean="0"/>
-              <a:t> </a:t>
-            </a:r>
-            <a:r>
-              <a:rPr lang="en-GB" sz="2400" dirty="0" err="1" smtClean="0"/>
-              <a:t>précédente</a:t>
-            </a:r>
-            <a:r>
-              <a:rPr lang="en-GB" sz="2400" smtClean="0"/>
-              <a:t>.</a:t>
-            </a:r>
-            <a:endParaRPr lang="fr-FR" sz="2400" dirty="0"/>
+              <a:rPr lang="fr-FR" sz="2400" dirty="0"/>
+              <a:t>Appuyez sur « la flèche de gauche » pour revenir et lire l’instruction précédente.</a:t>
+            </a:r>
           </a:p>
         </p:txBody>
       </p:sp>
@@ -5299,13 +4787,6 @@
   <p:clrMapOvr>
     <a:masterClrMapping/>
   </p:clrMapOvr>
-  <p:timing>
-    <p:tnLst>
-      <p:par>
-        <p:cTn id="1" dur="indefinite" restart="never" nodeType="tmRoot"/>
-      </p:par>
-    </p:tnLst>
-  </p:timing>
 </p:sld>
 </file>
 
@@ -5352,16 +4833,8 @@
               <a:buNone/>
             </a:pPr>
             <a:r>
-              <a:rPr lang="fr-FR" sz="2400" dirty="0" smtClean="0"/>
-              <a:t>Ce test </a:t>
-            </a:r>
-            <a:r>
-              <a:rPr lang="fr-FR" sz="2400" dirty="0"/>
-              <a:t>dure environ 1</a:t>
-            </a:r>
-            <a:r>
-              <a:rPr lang="fr-FR" sz="2400" dirty="0" smtClean="0"/>
-              <a:t>0 minutes. </a:t>
+              <a:rPr lang="fr-FR" sz="2400" dirty="0"/>
+              <a:t>Ce test dure environ 10 minutes. </a:t>
             </a:r>
           </a:p>
           <a:p>
@@ -5401,17 +4874,15 @@
               <a:rPr lang="fr-FR" sz="2400" dirty="0"/>
               <a:t>Vous devrez essayer de deviner lequel des deux écosystèmes aura donné le plus de plantes au bout d'un an. </a:t>
             </a:r>
-            <a:endParaRPr lang="fr-FR" sz="2400" dirty="0" smtClean="0"/>
           </a:p>
           <a:p>
             <a:pPr marL="0" indent="0" algn="ctr">
               <a:buNone/>
             </a:pPr>
             <a:r>
-              <a:rPr lang="fr-FR" sz="2400" dirty="0" smtClean="0"/>
+              <a:rPr lang="fr-FR" sz="2400" dirty="0"/>
               <a:t> </a:t>
             </a:r>
-            <a:endParaRPr lang="fr-FR" sz="2400" dirty="0"/>
           </a:p>
           <a:p>
             <a:pPr marL="0" indent="0" algn="ctr">
@@ -5419,13 +4890,8 @@
             </a:pPr>
             <a:r>
               <a:rPr lang="fr-FR" sz="2400" dirty="0"/>
-              <a:t>Ici, nous évaluons votre capacité à apprendre et comprendre, en présence d'incertitude, une règle cachée qui permet d'établir une prévision fiable</a:t>
-            </a:r>
-            <a:r>
-              <a:rPr lang="fr-FR" sz="2400" dirty="0" smtClean="0"/>
-              <a:t>.</a:t>
-            </a:r>
-            <a:endParaRPr lang="fr-FR" sz="2400" dirty="0"/>
+              <a:t>Ici, nous évaluons votre capacité à apprendre et comprendre, en présence d'incertitude, une règle cachée qui permet d'établir une prévision fiable.</a:t>
+            </a:r>
           </a:p>
         </p:txBody>
       </p:sp>
@@ -5439,13 +4905,6 @@
   <p:clrMapOvr>
     <a:masterClrMapping/>
   </p:clrMapOvr>
-  <p:timing>
-    <p:tnLst>
-      <p:par>
-        <p:cTn id="1" dur="indefinite" restart="never" nodeType="tmRoot"/>
-      </p:par>
-    </p:tnLst>
-  </p:timing>
 </p:sld>
 </file>
 
@@ -5492,36 +4951,18 @@
               <a:buNone/>
             </a:pPr>
             <a:r>
-              <a:rPr lang="fr-FR" sz="2400" dirty="0" smtClean="0"/>
-              <a:t>Ce test </a:t>
-            </a:r>
-            <a:r>
-              <a:rPr lang="fr-FR" sz="2400" dirty="0"/>
-              <a:t>dure environ </a:t>
-            </a:r>
-            <a:r>
-              <a:rPr lang="fr-FR" sz="2400" dirty="0" smtClean="0"/>
-              <a:t>30 minutes. </a:t>
-            </a:r>
-            <a:endParaRPr lang="fr-FR" sz="2400" dirty="0"/>
+              <a:rPr lang="fr-FR" sz="2400" dirty="0"/>
+              <a:t>Ce test dure environ 30 minutes. </a:t>
+            </a:r>
           </a:p>
           <a:p>
             <a:pPr marL="0" indent="0" algn="ctr">
               <a:buNone/>
             </a:pPr>
             <a:r>
-              <a:rPr lang="fr-FR" sz="2400" dirty="0" smtClean="0"/>
-              <a:t>Il implique </a:t>
-            </a:r>
-            <a:r>
-              <a:rPr lang="fr-FR" sz="2400" dirty="0"/>
-              <a:t>deux phases alternant entre elles </a:t>
-            </a:r>
-            <a:r>
-              <a:rPr lang="fr-FR" sz="2400" dirty="0" smtClean="0"/>
-              <a:t>:</a:t>
-            </a:r>
-            <a:endParaRPr lang="fr-FR" sz="2400" dirty="0"/>
+              <a:rPr lang="fr-FR" sz="2400" dirty="0"/>
+              <a:t>Il implique deux phases alternant entre elles :</a:t>
+            </a:r>
           </a:p>
           <a:p>
             <a:pPr algn="ctr"/>
@@ -5566,29 +5007,23 @@
             </a:r>
             <a:r>
               <a:rPr lang="fr-FR" sz="2400" dirty="0"/>
-              <a:t>», vous devrez prédire les choix </a:t>
-            </a:r>
-            <a:r>
-              <a:rPr lang="fr-FR" sz="2400" dirty="0" smtClean="0"/>
-              <a:t>plus ou moins prudents d’autres participants. </a:t>
-            </a:r>
+              <a:t>», vous devrez prédire les choix plus ou moins prudents d’autres participants. </a:t>
+            </a:r>
+          </a:p>
+          <a:p>
+            <a:pPr marL="0" indent="0" algn="ctr">
+              <a:buNone/>
+            </a:pPr>
             <a:endParaRPr lang="fr-FR" sz="2400" dirty="0"/>
           </a:p>
           <a:p>
             <a:pPr marL="0" indent="0" algn="ctr">
               <a:buNone/>
             </a:pPr>
-            <a:endParaRPr lang="fr-FR" sz="2400" dirty="0" smtClean="0"/>
-          </a:p>
-          <a:p>
-            <a:pPr marL="0" indent="0" algn="ctr">
-              <a:buNone/>
-            </a:pPr>
-            <a:r>
-              <a:rPr lang="fr-FR" sz="2400" dirty="0" smtClean="0"/>
-              <a:t>Chaque phase (décision ou prédiction) comporte 30 essais.</a:t>
-            </a:r>
-            <a:endParaRPr lang="fr-FR" sz="2400" dirty="0"/>
+            <a:r>
+              <a:rPr lang="fr-FR" sz="2400" dirty="0"/>
+              <a:t>Chaque phase (décision ou prédiction) comporte 18 essais.</a:t>
+            </a:r>
           </a:p>
           <a:p>
             <a:pPr marL="0" indent="0" algn="ctr">
@@ -5614,45 +5049,16 @@
             </a:r>
             <a:r>
               <a:rPr lang="fr-FR" sz="2400" dirty="0"/>
-              <a:t>pour avoir </a:t>
-            </a:r>
-            <a:r>
-              <a:rPr lang="fr-FR" sz="2400" dirty="0" smtClean="0"/>
-              <a:t>effectué ce test, </a:t>
-            </a:r>
-            <a:r>
-              <a:rPr lang="fr-FR" sz="2400" dirty="0"/>
-              <a:t>quelle que soit votre performance. De plus, nous sélectionnerons </a:t>
-            </a:r>
-            <a:r>
-              <a:rPr lang="fr-FR" sz="2400" dirty="0" smtClean="0"/>
-              <a:t>1 essai</a:t>
-            </a:r>
-            <a:r>
-              <a:rPr lang="fr-FR" sz="2400" b="1" dirty="0" smtClean="0"/>
+              <a:t>pour avoir effectué ce test, quelle que soit votre performance. De plus, nous sélectionnerons 1 essai</a:t>
+            </a:r>
+            <a:r>
+              <a:rPr lang="fr-FR" sz="2400" b="1" dirty="0"/>
               <a:t> </a:t>
             </a:r>
             <a:r>
-              <a:rPr lang="fr-FR" sz="2400" dirty="0" smtClean="0"/>
-              <a:t>d’une phase de prédiction au </a:t>
-            </a:r>
-            <a:r>
-              <a:rPr lang="fr-FR" sz="2400" dirty="0"/>
-              <a:t>hasard, et vous recevrez </a:t>
-            </a:r>
-            <a:r>
-              <a:rPr lang="fr-FR" sz="2400" dirty="0" smtClean="0"/>
-              <a:t>2 </a:t>
-            </a:r>
-            <a:r>
-              <a:rPr lang="fr-FR" sz="2400" dirty="0"/>
-              <a:t>euros </a:t>
-            </a:r>
-            <a:r>
-              <a:rPr lang="fr-FR" sz="2400" dirty="0" smtClean="0"/>
-              <a:t>si votre réponse est correcte.</a:t>
-            </a:r>
-            <a:endParaRPr lang="fr-FR" sz="2400" dirty="0"/>
+              <a:rPr lang="fr-FR" sz="2400" dirty="0"/>
+              <a:t>d’une phase de prédiction au hasard, et vous recevrez 2 euros si votre réponse est correcte.</a:t>
+            </a:r>
           </a:p>
         </p:txBody>
       </p:sp>
@@ -5666,13 +5072,6 @@
   <p:clrMapOvr>
     <a:masterClrMapping/>
   </p:clrMapOvr>
-  <p:timing>
-    <p:tnLst>
-      <p:par>
-        <p:cTn id="1" dur="indefinite" restart="never" nodeType="tmRoot"/>
-      </p:par>
-    </p:tnLst>
-  </p:timing>
 </p:sld>
 </file>
 
@@ -5726,30 +5125,14 @@
           <a:p>
             <a:r>
               <a:rPr lang="fr-FR" sz="2400" dirty="0"/>
-              <a:t> Succès de la </a:t>
-            </a:r>
-            <a:r>
-              <a:rPr lang="fr-FR" sz="2400" dirty="0" smtClean="0"/>
-              <a:t>reproduction: plus </a:t>
-            </a:r>
-            <a:r>
-              <a:rPr lang="fr-FR" sz="2400" dirty="0"/>
-              <a:t>les plantes réussissent à se reproduire, plus la quantité de plantes sera importante à la fin de l'année. Bien que le taux de reproduction des plantes soit inconnu a priori, vous saurez combien de ces plantes sont fertiles. </a:t>
+              <a:t> Succès de la reproduction: plus les plantes réussissent à se reproduire, plus la quantité de plantes sera importante à la fin de l'année. Bien que le taux de reproduction des plantes soit inconnu a priori, vous saurez combien de ces plantes sont fertiles. </a:t>
             </a:r>
             <a:endParaRPr lang="es-FR" sz="2400" dirty="0"/>
           </a:p>
           <a:p>
             <a:r>
               <a:rPr lang="fr-FR" sz="2400" dirty="0"/>
-              <a:t> Fréquence du contact avec des </a:t>
-            </a:r>
-            <a:r>
-              <a:rPr lang="fr-FR" sz="2400" dirty="0" smtClean="0"/>
-              <a:t>prédateurs: plus </a:t>
-            </a:r>
-            <a:r>
-              <a:rPr lang="fr-FR" sz="2400" dirty="0"/>
-              <a:t>les plantes sont en contact avec des prédateurs, moins la quantité de plantes sera importante à la fin de l'année. Bien que l'agressivité des prédateurs soit inconnu a priori, vous connaitrez la proportion P de plantes qui sont effectivement en contact avec le prédateur. Celle-ci sera représentée par la portion rouge d´un diagramme en camembert (voir la figure plus bas). Réciproquement, la portion verte du camembert représentera la proportion de plantes qui ne sont pas en contact avec les prédateurs.</a:t>
+              <a:t> Fréquence du contact avec des prédateurs: plus les plantes sont en contact avec des prédateurs, moins la quantité de plantes sera importante à la fin de l'année. Bien que l'agressivité des prédateurs soit inconnu a priori, vous connaitrez la proportion P de plantes qui sont effectivement en contact avec le prédateur. Celle-ci sera représentée par la portion rouge d´un diagramme en camembert (voir la figure plus bas). Réciproquement, la portion verte du camembert représentera la proportion de plantes qui ne sont pas en contact avec les prédateurs.</a:t>
             </a:r>
           </a:p>
           <a:p>
@@ -5757,10 +5140,9 @@
               <a:buNone/>
             </a:pPr>
             <a:r>
-              <a:rPr lang="fr-FR" sz="2400" dirty="0" smtClean="0"/>
+              <a:rPr lang="fr-FR" sz="2400" dirty="0"/>
               <a:t>                            </a:t>
             </a:r>
-            <a:endParaRPr lang="fr-FR" sz="2400" dirty="0"/>
           </a:p>
           <a:p>
             <a:pPr marL="0" indent="0" algn="just">
@@ -5794,7 +5176,7 @@
           <a:p>
             <a:pPr algn="ctr"/>
             <a:r>
-              <a:rPr lang="fr-FR" sz="2400" b="1" dirty="0" smtClean="0">
+              <a:rPr lang="fr-FR" sz="2400" b="1" dirty="0">
                 <a:solidFill>
                   <a:srgbClr val="0070C0"/>
                 </a:solidFill>
@@ -5819,13 +5201,6 @@
   <p:clrMapOvr>
     <a:masterClrMapping/>
   </p:clrMapOvr>
-  <p:timing>
-    <p:tnLst>
-      <p:par>
-        <p:cTn id="1" dur="indefinite" restart="never" nodeType="tmRoot"/>
-      </p:par>
-    </p:tnLst>
-  </p:timing>
 </p:sld>
 </file>
 
@@ -5899,15 +5274,7 @@
               <a:pPr algn="just"/>
               <a:r>
                 <a:rPr lang="fr-FR" sz="2400" dirty="0"/>
-                <a:t>60 plantes sont fertiles    </a:t>
-              </a:r>
-              <a:r>
-                <a:rPr lang="fr-FR" sz="2400" dirty="0" smtClean="0"/>
-                <a:t>        Toutes </a:t>
-              </a:r>
-              <a:r>
-                <a:rPr lang="fr-FR" sz="2400" dirty="0"/>
-                <a:t>les plantes sont fertiles</a:t>
+                <a:t>60 plantes sont fertiles            Toutes les plantes sont fertiles</a:t>
               </a:r>
             </a:p>
             <a:p>
@@ -5917,15 +5284,7 @@
             <a:p>
               <a:r>
                 <a:rPr lang="en-GB" sz="2400" dirty="0"/>
-                <a:t>                                              </a:t>
-              </a:r>
-              <a:r>
-                <a:rPr lang="en-GB" sz="2400" dirty="0" smtClean="0"/>
-                <a:t>vs</a:t>
-              </a:r>
-              <a:r>
-                <a:rPr lang="en-GB" sz="2400" dirty="0"/>
-                <a:t>.</a:t>
+                <a:t>                                              vs.</a:t>
               </a:r>
             </a:p>
           </p:txBody>
@@ -6035,7 +5394,7 @@
           <a:p>
             <a:pPr algn="ctr"/>
             <a:r>
-              <a:rPr lang="fr-FR" sz="2400" b="1" dirty="0" smtClean="0">
+              <a:rPr lang="fr-FR" sz="2400" b="1" dirty="0">
                 <a:solidFill>
                   <a:srgbClr val="0070C0"/>
                 </a:solidFill>
@@ -6073,22 +5432,21 @@
           <a:p>
             <a:pPr algn="ctr"/>
             <a:r>
-              <a:rPr lang="fr-FR" sz="2400" dirty="0" smtClean="0"/>
+              <a:rPr lang="fr-FR" sz="2400" dirty="0"/>
               <a:t>L’un des écosystème n’aura aucun contact avec les prédateurs, mais seulement certaines de ses plantes seront fertiles.</a:t>
             </a:r>
-            <a:endParaRPr lang="fr-FR" sz="2400" dirty="0"/>
-          </a:p>
-          <a:p>
-            <a:pPr algn="ctr"/>
-            <a:r>
-              <a:rPr lang="fr-FR" sz="2400" dirty="0" smtClean="0"/>
+          </a:p>
+          <a:p>
+            <a:pPr algn="ctr"/>
+            <a:r>
+              <a:rPr lang="fr-FR" sz="2400" dirty="0"/>
               <a:t>L’autre sera tel que ses plantes seront toutes fertiles, mais une proportion P d’entre elles seront en contact avec des prédateurs.</a:t>
             </a:r>
           </a:p>
           <a:p>
             <a:pPr algn="ctr"/>
             <a:r>
-              <a:rPr lang="fr-FR" sz="2400" dirty="0" smtClean="0"/>
+              <a:rPr lang="fr-FR" sz="2400" dirty="0"/>
               <a:t>Vous devrez parier sur celui qui aura le plus de plantes à la fin de l’année:</a:t>
             </a:r>
           </a:p>
@@ -6146,10 +5504,9 @@
           <a:p>
             <a:pPr algn="ctr"/>
             <a:r>
-              <a:rPr lang="fr-FR" sz="2400" i="1" dirty="0" smtClean="0"/>
+              <a:rPr lang="fr-FR" sz="2400" i="1" dirty="0"/>
               <a:t>Chaque écosystème démarre avec 80 plantes. Lequel en aura le plus à la fin de l’année?</a:t>
             </a:r>
-            <a:endParaRPr lang="fr-FR" sz="2400" i="1" dirty="0"/>
           </a:p>
         </p:txBody>
       </p:sp>
@@ -6163,13 +5520,6 @@
   <p:clrMapOvr>
     <a:masterClrMapping/>
   </p:clrMapOvr>
-  <p:timing>
-    <p:tnLst>
-      <p:par>
-        <p:cTn id="1" dur="indefinite" restart="never" nodeType="tmRoot"/>
-      </p:par>
-    </p:tnLst>
-  </p:timing>
 </p:sld>
 </file>
 
@@ -6216,34 +5566,9 @@
               <a:buNone/>
             </a:pPr>
             <a:r>
-              <a:rPr lang="fr-FR" sz="2400" dirty="0" smtClean="0"/>
-              <a:t>Pour certaines prédictions, nous </a:t>
-            </a:r>
-            <a:r>
-              <a:rPr lang="fr-FR" sz="2400" dirty="0"/>
-              <a:t>vous </a:t>
-            </a:r>
-            <a:r>
-              <a:rPr lang="fr-FR" sz="2400" dirty="0" smtClean="0"/>
-              <a:t>demanderons </a:t>
-            </a:r>
-            <a:r>
-              <a:rPr lang="fr-FR" sz="2400" dirty="0"/>
-              <a:t>d’exprimer votre degré de </a:t>
-            </a:r>
-            <a:r>
-              <a:rPr lang="fr-FR" sz="2400" dirty="0" smtClean="0"/>
-              <a:t>confiance </a:t>
-            </a:r>
-            <a:r>
-              <a:rPr lang="fr-FR" sz="2400" dirty="0"/>
-              <a:t>avant de vous dire si </a:t>
-            </a:r>
-            <a:r>
-              <a:rPr lang="fr-FR" sz="2400" dirty="0" smtClean="0"/>
-              <a:t>votre prédiction était correcte: </a:t>
-            </a:r>
-            <a:endParaRPr lang="fr-FR" sz="2400" dirty="0"/>
+              <a:rPr lang="fr-FR" sz="2400" dirty="0"/>
+              <a:t>Pour certaines prédictions, nous vous demanderons d’exprimer votre degré de confiance avant de vous dire si votre prédiction était correcte: </a:t>
+            </a:r>
           </a:p>
         </p:txBody>
       </p:sp>
@@ -6307,7 +5632,7 @@
           <a:p>
             <a:pPr algn="ctr"/>
             <a:r>
-              <a:rPr lang="fr-FR" sz="2400" b="1" dirty="0" smtClean="0">
+              <a:rPr lang="fr-FR" sz="2400" b="1" dirty="0">
                 <a:solidFill>
                   <a:srgbClr val="0070C0"/>
                 </a:solidFill>
@@ -6345,12 +5670,8 @@
           <a:p>
             <a:pPr algn="ctr"/>
             <a:r>
-              <a:rPr lang="fr-FR" sz="2400" dirty="0" smtClean="0"/>
-              <a:t>Pour </a:t>
-            </a:r>
-            <a:r>
-              <a:rPr lang="fr-FR" sz="2400" dirty="0"/>
-              <a:t>répondre, vous déplacerez le pointeur de la barre de défilement avec la souris.</a:t>
+              <a:rPr lang="fr-FR" sz="2400" dirty="0"/>
+              <a:t>Pour répondre, vous déplacerez le pointeur de la barre de défilement avec la souris.</a:t>
             </a:r>
           </a:p>
           <a:p>
@@ -6360,26 +5681,9 @@
           <a:p>
             <a:pPr algn="ctr"/>
             <a:r>
-              <a:rPr lang="fr-FR" sz="2400" dirty="0" smtClean="0"/>
-              <a:t>Attention: si </a:t>
-            </a:r>
-            <a:r>
-              <a:rPr lang="fr-FR" sz="2400" dirty="0"/>
-              <a:t>vous ne déplacez pas la </a:t>
-            </a:r>
-            <a:r>
-              <a:rPr lang="fr-FR" sz="2400" dirty="0" smtClean="0"/>
-              <a:t>barre, </a:t>
-            </a:r>
-            <a:r>
-              <a:rPr lang="fr-FR" sz="2400" dirty="0"/>
-              <a:t>vous ne pourrez pas </a:t>
-            </a:r>
-            <a:r>
-              <a:rPr lang="fr-FR" sz="2400" dirty="0" smtClean="0"/>
-              <a:t>continuer le test.</a:t>
-            </a:r>
-            <a:endParaRPr lang="fr-FR" sz="2400" dirty="0"/>
+              <a:rPr lang="fr-FR" sz="2400" dirty="0"/>
+              <a:t>Attention: si vous ne déplacez pas la barre, vous ne pourrez pas continuer le test.</a:t>
+            </a:r>
           </a:p>
         </p:txBody>
       </p:sp>
@@ -6393,13 +5697,6 @@
   <p:clrMapOvr>
     <a:masterClrMapping/>
   </p:clrMapOvr>
-  <p:timing>
-    <p:tnLst>
-      <p:par>
-        <p:cTn id="1" dur="indefinite" restart="never" nodeType="tmRoot"/>
-      </p:par>
-    </p:tnLst>
-  </p:timing>
 </p:sld>
 </file>
 
@@ -6444,20 +5741,8 @@
           <a:p>
             <a:pPr algn="ctr"/>
             <a:r>
-              <a:rPr lang="fr-FR" sz="2400" dirty="0" smtClean="0"/>
-              <a:t>Le test d’apprentissage </a:t>
-            </a:r>
-            <a:r>
-              <a:rPr lang="fr-FR" sz="2400" dirty="0"/>
-              <a:t>est maintenant </a:t>
-            </a:r>
-            <a:r>
-              <a:rPr lang="fr-FR" sz="2400" dirty="0" smtClean="0"/>
-              <a:t>terminé.</a:t>
-            </a:r>
-            <a:r>
-              <a:rPr lang="fr-FR" sz="2400" dirty="0"/>
-              <a:t/>
+              <a:rPr lang="fr-FR" sz="2400" dirty="0"/>
+              <a:t>Le test d’apprentissage est maintenant terminé.</a:t>
             </a:r>
             <a:br>
               <a:rPr lang="fr-FR" sz="2400" dirty="0"/>
@@ -6510,18 +5795,13 @@
               </a:spcAft>
             </a:pPr>
             <a:r>
-              <a:rPr lang="en-GB" sz="2400" b="1" dirty="0" smtClean="0">
+              <a:rPr lang="en-GB" sz="2400" b="1" dirty="0">
                 <a:solidFill>
                   <a:srgbClr val="0070C0"/>
                 </a:solidFill>
               </a:rPr>
               <a:t>FIN DU TEST D’APPRENTISSAGE</a:t>
             </a:r>
-            <a:endParaRPr lang="en-GB" sz="2400" b="1" dirty="0">
-              <a:solidFill>
-                <a:srgbClr val="0070C0"/>
-              </a:solidFill>
-            </a:endParaRPr>
           </a:p>
         </p:txBody>
       </p:sp>
@@ -6599,13 +5879,6 @@
   <p:clrMapOvr>
     <a:masterClrMapping/>
   </p:clrMapOvr>
-  <p:timing>
-    <p:tnLst>
-      <p:par>
-        <p:cTn id="1" dur="indefinite" restart="never" nodeType="tmRoot"/>
-      </p:par>
-    </p:tnLst>
-  </p:timing>
 </p:sld>
 </file>
 
@@ -6680,21 +5953,8 @@
             </a:pPr>
             <a:r>
               <a:rPr lang="fr-FR" sz="2400" dirty="0"/>
-              <a:t>Vous allez jouer à un jeu d´argent </a:t>
-            </a:r>
-            <a:r>
-              <a:rPr lang="fr-FR" sz="2400" dirty="0" smtClean="0"/>
-              <a:t>virtuel dans </a:t>
-            </a:r>
-            <a:r>
-              <a:rPr lang="fr-FR" sz="2400" dirty="0"/>
-              <a:t>lequel vous aurez à choisir entre un gain modéré mais certain (option 1) et un gain important mais risqué (option 2). </a:t>
-            </a:r>
-            <a:r>
-              <a:rPr lang="fr-FR" sz="2400" dirty="0" smtClean="0"/>
-              <a:t>C’est ce que nous appelons un « choix risqué ». Nous vous proposerons 34 choix risqués pour chaque phase de prédiction.</a:t>
-            </a:r>
-            <a:endParaRPr lang="fr-FR" sz="2400" dirty="0"/>
+              <a:t>Vous allez jouer à un jeu d´argent virtuel dans lequel vous aurez à choisir entre un gain modéré mais certain (option 1) et un gain important mais risqué (option 2). C’est ce que nous appelons un « choix risqué ». Nous vous proposerons 18 choix risqués pour chaque phase de prédiction.</a:t>
+            </a:r>
           </a:p>
           <a:p>
             <a:pPr marL="0" indent="0" algn="ctr">
@@ -6737,7 +5997,7 @@
           <a:p>
             <a:pPr algn="ctr"/>
             <a:r>
-              <a:rPr lang="fr-FR" sz="2400" b="1" dirty="0" smtClean="0">
+              <a:rPr lang="fr-FR" sz="2400" b="1" dirty="0">
                 <a:solidFill>
                   <a:srgbClr val="0070C0"/>
                 </a:solidFill>
@@ -6762,13 +6022,6 @@
   <p:clrMapOvr>
     <a:masterClrMapping/>
   </p:clrMapOvr>
-  <p:timing>
-    <p:tnLst>
-      <p:par>
-        <p:cTn id="1" dur="indefinite" restart="never" nodeType="tmRoot"/>
-      </p:par>
-    </p:tnLst>
-  </p:timing>
 </p:sld>
 </file>
 
@@ -6815,32 +6068,8 @@
               <a:buNone/>
             </a:pPr>
             <a:r>
-              <a:rPr lang="fr-FR" sz="2400" dirty="0" smtClean="0"/>
-              <a:t>A </a:t>
-            </a:r>
-            <a:r>
-              <a:rPr lang="fr-FR" sz="2400" dirty="0"/>
-              <a:t>chaque </a:t>
-            </a:r>
-            <a:r>
-              <a:rPr lang="fr-FR" sz="2400" dirty="0" smtClean="0"/>
-              <a:t>choix, </a:t>
-            </a:r>
-            <a:r>
-              <a:rPr lang="fr-FR" sz="2400" dirty="0"/>
-              <a:t>vous recevrez une quantité </a:t>
-            </a:r>
-            <a:r>
-              <a:rPr lang="fr-FR" sz="2400" dirty="0" smtClean="0"/>
-              <a:t>virtuelle d’argent </a:t>
-            </a:r>
-            <a:r>
-              <a:rPr lang="fr-FR" sz="2400" dirty="0"/>
-              <a:t>de 50 euros. Vous devrez choisir entre une option sûre et une option </a:t>
-            </a:r>
-            <a:r>
-              <a:rPr lang="fr-FR" sz="2400" dirty="0" smtClean="0"/>
-              <a:t>risquée.</a:t>
+              <a:rPr lang="fr-FR" sz="2400" dirty="0"/>
+              <a:t>A chaque choix, vous recevrez une quantité virtuelle d’argent de 50 euros. Vous devrez choisir entre une option sûre et une option risquée.</a:t>
             </a:r>
           </a:p>
           <a:p>
@@ -6848,12 +6077,8 @@
               <a:buNone/>
             </a:pPr>
             <a:r>
-              <a:rPr lang="fr-FR" sz="2400" dirty="0" smtClean="0"/>
-              <a:t>Si </a:t>
-            </a:r>
-            <a:r>
-              <a:rPr lang="fr-FR" sz="2400" dirty="0"/>
-              <a:t>vous choisissez l'option sûre, vous garderez ou perdrez une partie des 50 euros initiaux. Lisez attentivement les instructions: parfois, les instructions indiqueront « Perdre X euros » et parfois, elles indiqueront « Garder X euros ».</a:t>
+              <a:rPr lang="fr-FR" sz="2400" dirty="0"/>
+              <a:t>Si vous choisissez l'option sûre, vous garderez ou perdrez une partie des 50 euros initiaux. Lisez attentivement les instructions: parfois, les instructions indiqueront « Perdre X euros » et parfois, elles indiqueront « Garder X euros ».</a:t>
             </a:r>
           </a:p>
           <a:p>
@@ -6862,13 +6087,8 @@
             </a:pPr>
             <a:r>
               <a:rPr lang="fr-FR" sz="2400" dirty="0"/>
-              <a:t>Si vous choisissez l'option risquée, vous pariez que vous gardez les 50 euros avec une probabilité P, par exemple 25%. Dans ce cas, évidemment, il y a 75% de risque que vous perdiez les 50 euros. Donc, plus la probabilité P est petite, plus vous prenez un risque important. La probabilité P de garder les 50 euros sera représentée par la portion verte d´un diagramme en camembert (voir la figure plus bas) et la probabilité 1-P de perdre les 50 euros sera représentée par la portion </a:t>
-            </a:r>
-            <a:r>
-              <a:rPr lang="fr-FR" sz="2400" dirty="0" smtClean="0"/>
-              <a:t>rouge:</a:t>
-            </a:r>
-            <a:endParaRPr lang="fr-FR" sz="2400" dirty="0"/>
+              <a:t>Si vous choisissez l'option risquée, vous pariez que vous gardez les 50 euros avec une probabilité P, par exemple 25%. Dans ce cas, évidemment, il y a 75% de risque que vous perdiez les 50 euros. Donc, plus la probabilité P est petite, plus vous prenez un risque important. La probabilité P de garder les 50 euros sera représentée par la portion verte d´un diagramme en camembert (voir la figure plus bas) et la probabilité 1-P de perdre les 50 euros sera représentée par la portion rouge:</a:t>
+            </a:r>
           </a:p>
           <a:p>
             <a:pPr marL="0" indent="0" algn="ctr">
@@ -6945,7 +6165,7 @@
           <a:p>
             <a:pPr algn="ctr"/>
             <a:r>
-              <a:rPr lang="fr-FR" sz="2400" b="1" dirty="0" smtClean="0">
+              <a:rPr lang="fr-FR" sz="2400" b="1" dirty="0">
                 <a:solidFill>
                   <a:srgbClr val="0070C0"/>
                 </a:solidFill>
@@ -6970,13 +6190,6 @@
   <p:clrMapOvr>
     <a:masterClrMapping/>
   </p:clrMapOvr>
-  <p:timing>
-    <p:tnLst>
-      <p:par>
-        <p:cTn id="1" dur="indefinite" restart="never" nodeType="tmRoot"/>
-      </p:par>
-    </p:tnLst>
-  </p:timing>
 </p:sld>
 </file>
 
@@ -7023,28 +6236,8 @@
               <a:buNone/>
             </a:pPr>
             <a:r>
-              <a:rPr lang="fr-FR" sz="2400" i="1" dirty="0" smtClean="0"/>
-              <a:t>Vous recevez </a:t>
-            </a:r>
-            <a:r>
               <a:rPr lang="fr-FR" sz="2400" i="1" dirty="0"/>
-              <a:t>une somme </a:t>
-            </a:r>
-            <a:r>
-              <a:rPr lang="fr-FR" sz="2400" i="1" dirty="0" smtClean="0"/>
-              <a:t>initiale </a:t>
-            </a:r>
-            <a:r>
-              <a:rPr lang="fr-FR" sz="2400" i="1" dirty="0"/>
-              <a:t>de 50 euros. Quelle option </a:t>
-            </a:r>
-            <a:r>
-              <a:rPr lang="fr-FR" sz="2400" i="1" dirty="0" smtClean="0"/>
-              <a:t>allez-vous </a:t>
-            </a:r>
-            <a:r>
-              <a:rPr lang="fr-FR" sz="2400" i="1" dirty="0"/>
-              <a:t>choisir ?</a:t>
+              <a:t>Vous recevez une somme initiale de 50 euros. Quelle option allez-vous choisir ?</a:t>
             </a:r>
           </a:p>
           <a:p>
@@ -7063,23 +6256,11 @@
                   <a:srgbClr val="FF0000"/>
                 </a:solidFill>
               </a:rPr>
-              <a:t>                              </a:t>
-            </a:r>
-            <a:r>
-              <a:rPr lang="fr-FR" sz="2400" dirty="0" smtClean="0">
-                <a:solidFill>
-                  <a:srgbClr val="FF0000"/>
-                </a:solidFill>
-              </a:rPr>
-              <a:t>      </a:t>
-            </a:r>
-            <a:r>
-              <a:rPr lang="fr-FR" sz="2400" dirty="0" smtClean="0"/>
-              <a:t>Option </a:t>
-            </a:r>
-            <a:r>
-              <a:rPr lang="fr-FR" sz="2400" dirty="0"/>
-              <a:t>sûre</a:t>
+              <a:t>                                    </a:t>
+            </a:r>
+            <a:r>
+              <a:rPr lang="fr-FR" sz="2400" dirty="0"/>
+              <a:t>Option sûre</a:t>
             </a:r>
             <a:r>
               <a:rPr lang="fr-FR" sz="2400" dirty="0">
@@ -7090,12 +6271,8 @@
               <a:t>                                 </a:t>
             </a:r>
             <a:r>
-              <a:rPr lang="fr-FR" sz="2400" dirty="0" smtClean="0"/>
-              <a:t>Option </a:t>
-            </a:r>
-            <a:r>
-              <a:rPr lang="fr-FR" sz="2400" dirty="0"/>
-              <a:t>risquée</a:t>
+              <a:rPr lang="fr-FR" sz="2400" dirty="0"/>
+              <a:t>Option risquée</a:t>
             </a:r>
           </a:p>
           <a:p>
@@ -7116,19 +6293,7 @@
             </a:pPr>
             <a:r>
               <a:rPr lang="fr-FR" sz="2400" dirty="0"/>
-              <a:t>		  </a:t>
-            </a:r>
-            <a:r>
-              <a:rPr lang="fr-FR" sz="2400" dirty="0" smtClean="0"/>
-              <a:t>    Garder </a:t>
-            </a:r>
-            <a:r>
-              <a:rPr lang="fr-FR" sz="2400" dirty="0"/>
-              <a:t>13 euros            </a:t>
-            </a:r>
-            <a:r>
-              <a:rPr lang="fr-FR" sz="2400" dirty="0" smtClean="0"/>
-              <a:t>vs. </a:t>
+              <a:t>		      Garder 13 euros            vs. </a:t>
             </a:r>
           </a:p>
           <a:p>
@@ -7255,7 +6420,7 @@
           <a:p>
             <a:pPr algn="ctr"/>
             <a:r>
-              <a:rPr lang="fr-FR" sz="2400" b="1" dirty="0" smtClean="0">
+              <a:rPr lang="fr-FR" sz="2400" b="1" dirty="0">
                 <a:solidFill>
                   <a:srgbClr val="0070C0"/>
                 </a:solidFill>
@@ -7294,37 +6459,8 @@
             <a:pPr algn="just"/>
             <a:r>
               <a:rPr lang="fr-FR" sz="2400" dirty="0"/>
-              <a:t>A chaque essai, regardez les deux options qui </a:t>
-            </a:r>
-            <a:r>
-              <a:rPr lang="fr-FR" sz="2400" dirty="0" smtClean="0"/>
-              <a:t>vous sont présentées et </a:t>
-            </a:r>
-            <a:r>
-              <a:rPr lang="fr-FR" sz="2400" dirty="0"/>
-              <a:t>indiquez celle </a:t>
-            </a:r>
-            <a:r>
-              <a:rPr lang="fr-FR" sz="2400" dirty="0" smtClean="0"/>
-              <a:t>que vous préférez </a:t>
-            </a:r>
-            <a:r>
-              <a:rPr lang="fr-FR" sz="2400" dirty="0"/>
-              <a:t>en cliquant sur le bouton </a:t>
-            </a:r>
-            <a:r>
-              <a:rPr lang="fr-FR" sz="2400" dirty="0" smtClean="0"/>
-              <a:t>« je choisis </a:t>
-            </a:r>
-            <a:r>
-              <a:rPr lang="fr-FR" sz="2400" dirty="0"/>
-              <a:t>cette option </a:t>
-            </a:r>
-            <a:r>
-              <a:rPr lang="fr-FR" sz="2400" dirty="0" smtClean="0"/>
-              <a:t>! »:</a:t>
-            </a:r>
-            <a:endParaRPr lang="fr-FR" sz="2400" dirty="0"/>
+              <a:t>A chaque essai, regardez les deux options qui vous sont présentées et indiquez celle que vous préférez en cliquant sur le bouton « je choisis cette option ! »:</a:t>
+            </a:r>
           </a:p>
         </p:txBody>
       </p:sp>
@@ -7402,10 +6538,9 @@
           <a:p>
             <a:pPr algn="ctr"/>
             <a:r>
-              <a:rPr lang="fr-FR" dirty="0" smtClean="0"/>
+              <a:rPr lang="fr-FR" dirty="0"/>
               <a:t>Je choisis cette option</a:t>
             </a:r>
-            <a:endParaRPr lang="fr-FR" dirty="0"/>
           </a:p>
         </p:txBody>
       </p:sp>
@@ -7483,10 +6618,9 @@
           <a:p>
             <a:pPr algn="ctr"/>
             <a:r>
-              <a:rPr lang="fr-FR" dirty="0" smtClean="0"/>
+              <a:rPr lang="fr-FR" dirty="0"/>
               <a:t>Je choisis cette option</a:t>
             </a:r>
-            <a:endParaRPr lang="fr-FR" dirty="0"/>
           </a:p>
         </p:txBody>
       </p:sp>
@@ -7500,13 +6634,6 @@
   <p:clrMapOvr>
     <a:masterClrMapping/>
   </p:clrMapOvr>
-  <p:timing>
-    <p:tnLst>
-      <p:par>
-        <p:cTn id="1" dur="indefinite" restart="never" nodeType="tmRoot"/>
-      </p:par>
-    </p:tnLst>
-  </p:timing>
 </p:sld>
 </file>
 
@@ -7581,15 +6708,7 @@
             </a:pPr>
             <a:r>
               <a:rPr lang="fr-FR" sz="2400" dirty="0"/>
-              <a:t>Ici, nous évaluerons votre capacité à comprendre et à anticiper la prise de risque d´autres personnes. Vous aurez la possibilité d´améliorer progressivement vos prédictions. En effet, après chaque </a:t>
-            </a:r>
-            <a:r>
-              <a:rPr lang="fr-FR" sz="2400" dirty="0" smtClean="0"/>
-              <a:t>prédiction, </a:t>
-            </a:r>
-            <a:r>
-              <a:rPr lang="fr-FR" sz="2400" dirty="0"/>
-              <a:t>nous vous dirons si elle était correcte ou non. </a:t>
+              <a:t>Ici, nous évaluerons votre capacité à comprendre et à anticiper la prise de risque d´autres personnes. Vous aurez la possibilité d´améliorer progressivement vos prédictions. En effet, après chaque prédiction, nous vous dirons si elle était correcte ou non. </a:t>
             </a:r>
           </a:p>
           <a:p>
@@ -7604,15 +6723,7 @@
             </a:pPr>
             <a:r>
               <a:rPr lang="fr-FR" sz="2400" dirty="0"/>
-              <a:t>Vous devrez effectuer ce jeu plusieurs fois. Attention : chaque phase de prédiction correspond à un participant </a:t>
-            </a:r>
-            <a:r>
-              <a:rPr lang="fr-FR" sz="2400" dirty="0" smtClean="0"/>
-              <a:t>différent </a:t>
-            </a:r>
-            <a:r>
-              <a:rPr lang="fr-FR" sz="2400" dirty="0"/>
-              <a:t>qui pourra être plus ou moins prudent(e) que la normale. </a:t>
+              <a:t>Vous devrez effectuer ce jeu plusieurs fois. Attention : chaque phase de prédiction correspond à un participant différent qui pourra être plus ou moins prudent(e) que la normale. </a:t>
             </a:r>
             <a:endParaRPr lang="es-FR" sz="2400" dirty="0"/>
           </a:p>
@@ -7648,7 +6759,7 @@
           <a:p>
             <a:pPr algn="ctr"/>
             <a:r>
-              <a:rPr lang="fr-FR" sz="2400" b="1" dirty="0" smtClean="0">
+              <a:rPr lang="fr-FR" sz="2400" b="1" dirty="0">
                 <a:solidFill>
                   <a:srgbClr val="0070C0"/>
                 </a:solidFill>
@@ -7673,13 +6784,6 @@
   <p:clrMapOvr>
     <a:masterClrMapping/>
   </p:clrMapOvr>
-  <p:timing>
-    <p:tnLst>
-      <p:par>
-        <p:cTn id="1" dur="indefinite" restart="never" nodeType="tmRoot"/>
-      </p:par>
-    </p:tnLst>
-  </p:timing>
 </p:sld>
 </file>
 
@@ -7726,20 +6830,8 @@
               <a:buNone/>
             </a:pPr>
             <a:r>
-              <a:rPr lang="fr-FR" sz="2400" i="1" dirty="0" smtClean="0"/>
-              <a:t>Julia </a:t>
-            </a:r>
-            <a:r>
               <a:rPr lang="fr-FR" sz="2400" i="1" dirty="0"/>
-              <a:t>reçoit une somme </a:t>
-            </a:r>
-            <a:r>
-              <a:rPr lang="fr-FR" sz="2400" i="1" dirty="0" smtClean="0"/>
-              <a:t>initiale </a:t>
-            </a:r>
-            <a:r>
-              <a:rPr lang="fr-FR" sz="2400" i="1" dirty="0"/>
-              <a:t>de 50 euros. Quelle option va t-elle choisir ?</a:t>
+              <a:t>Julia reçoit une somme initiale de 50 euros. Quelle option va t-elle choisir ?</a:t>
             </a:r>
           </a:p>
           <a:p>
@@ -7758,23 +6850,11 @@
                   <a:srgbClr val="FF0000"/>
                 </a:solidFill>
               </a:rPr>
-              <a:t>                              </a:t>
-            </a:r>
-            <a:r>
-              <a:rPr lang="fr-FR" sz="2400" dirty="0" smtClean="0">
-                <a:solidFill>
-                  <a:srgbClr val="FF0000"/>
-                </a:solidFill>
-              </a:rPr>
-              <a:t>      </a:t>
-            </a:r>
-            <a:r>
-              <a:rPr lang="fr-FR" sz="2400" dirty="0" smtClean="0"/>
-              <a:t>Option </a:t>
-            </a:r>
-            <a:r>
-              <a:rPr lang="fr-FR" sz="2400" dirty="0"/>
-              <a:t>sûre</a:t>
+              <a:t>                                    </a:t>
+            </a:r>
+            <a:r>
+              <a:rPr lang="fr-FR" sz="2400" dirty="0"/>
+              <a:t>Option sûre</a:t>
             </a:r>
             <a:r>
               <a:rPr lang="fr-FR" sz="2400" dirty="0">
@@ -7785,12 +6865,8 @@
               <a:t>                                 </a:t>
             </a:r>
             <a:r>
-              <a:rPr lang="fr-FR" sz="2400" dirty="0" smtClean="0"/>
-              <a:t>Option </a:t>
-            </a:r>
-            <a:r>
-              <a:rPr lang="fr-FR" sz="2400" dirty="0"/>
-              <a:t>risquée</a:t>
+              <a:rPr lang="fr-FR" sz="2400" dirty="0"/>
+              <a:t>Option risquée</a:t>
             </a:r>
           </a:p>
           <a:p>
@@ -7811,19 +6887,7 @@
             </a:pPr>
             <a:r>
               <a:rPr lang="fr-FR" sz="2400" dirty="0"/>
-              <a:t>		  </a:t>
-            </a:r>
-            <a:r>
-              <a:rPr lang="fr-FR" sz="2400" dirty="0" smtClean="0"/>
-              <a:t>    Garder </a:t>
-            </a:r>
-            <a:r>
-              <a:rPr lang="fr-FR" sz="2400" dirty="0"/>
-              <a:t>13 euros            </a:t>
-            </a:r>
-            <a:r>
-              <a:rPr lang="fr-FR" sz="2400" dirty="0" smtClean="0"/>
-              <a:t>vs. </a:t>
+              <a:t>		      Garder 13 euros            vs. </a:t>
             </a:r>
           </a:p>
           <a:p>
@@ -7950,7 +7014,7 @@
           <a:p>
             <a:pPr algn="ctr"/>
             <a:r>
-              <a:rPr lang="fr-FR" sz="2400" b="1" dirty="0" smtClean="0">
+              <a:rPr lang="fr-FR" sz="2400" b="1" dirty="0">
                 <a:solidFill>
                   <a:srgbClr val="0070C0"/>
                 </a:solidFill>
@@ -7989,21 +7053,8 @@
             <a:pPr algn="just"/>
             <a:r>
               <a:rPr lang="fr-FR" sz="2400" dirty="0"/>
-              <a:t>A chaque essai, regardez les deux options qui ont été présentées à l’autre personne et indiquez celle que vous pensez qu’elle a choisi en cliquant sur le bouton </a:t>
-            </a:r>
-            <a:r>
-              <a:rPr lang="fr-FR" sz="2400" dirty="0" smtClean="0"/>
-              <a:t>« Il </a:t>
-            </a:r>
-            <a:r>
-              <a:rPr lang="fr-FR" sz="2400" dirty="0"/>
-              <a:t>/ Elle choisira cette option </a:t>
-            </a:r>
-            <a:r>
-              <a:rPr lang="fr-FR" sz="2400" dirty="0" smtClean="0"/>
-              <a:t>! »:</a:t>
-            </a:r>
-            <a:endParaRPr lang="fr-FR" sz="2400" dirty="0"/>
+              <a:t>A chaque essai, regardez les deux options qui ont été présentées à l’autre personne et indiquez celle que vous pensez qu’elle a choisi en cliquant sur le bouton « Il / Elle choisira cette option ! »:</a:t>
+            </a:r>
           </a:p>
         </p:txBody>
       </p:sp>
@@ -8081,10 +7132,9 @@
           <a:p>
             <a:pPr algn="ctr"/>
             <a:r>
-              <a:rPr lang="fr-FR" dirty="0" smtClean="0"/>
+              <a:rPr lang="fr-FR" dirty="0"/>
               <a:t>Elle choisira cette option</a:t>
             </a:r>
-            <a:endParaRPr lang="fr-FR" dirty="0"/>
           </a:p>
         </p:txBody>
       </p:sp>
@@ -8162,10 +7212,9 @@
           <a:p>
             <a:pPr algn="ctr"/>
             <a:r>
-              <a:rPr lang="fr-FR" dirty="0" smtClean="0"/>
+              <a:rPr lang="fr-FR" dirty="0"/>
               <a:t>Elle choisira cette option</a:t>
             </a:r>
-            <a:endParaRPr lang="fr-FR" dirty="0"/>
           </a:p>
         </p:txBody>
       </p:sp>
@@ -8179,13 +7228,6 @@
   <p:clrMapOvr>
     <a:masterClrMapping/>
   </p:clrMapOvr>
-  <p:timing>
-    <p:tnLst>
-      <p:par>
-        <p:cTn id="1" dur="indefinite" restart="never" nodeType="tmRoot"/>
-      </p:par>
-    </p:tnLst>
-  </p:timing>
 </p:sld>
 </file>
 
@@ -8230,7 +7272,7 @@
           <a:p>
             <a:pPr algn="ctr"/>
             <a:r>
-              <a:rPr lang="fr-FR" sz="2400" b="1" dirty="0" smtClean="0">
+              <a:rPr lang="fr-FR" sz="2400" b="1" dirty="0">
                 <a:solidFill>
                   <a:srgbClr val="0070C0"/>
                 </a:solidFill>
@@ -8268,107 +7310,63 @@
           <a:p>
             <a:pPr algn="ctr"/>
             <a:r>
-              <a:rPr lang="fr-FR" sz="2400" dirty="0" smtClean="0"/>
+              <a:rPr lang="fr-FR" sz="2400" dirty="0"/>
               <a:t>Pour la phase de prédiction, il y a une réponse correcte: il s’agit du choix qui a effectivement été pris par le participant avant vous.</a:t>
             </a:r>
           </a:p>
           <a:p>
             <a:pPr algn="ctr"/>
             <a:r>
-              <a:rPr lang="fr-FR" sz="2400" dirty="0" smtClean="0"/>
-              <a:t>Nous </a:t>
-            </a:r>
-            <a:r>
-              <a:rPr lang="fr-FR" sz="2400" dirty="0"/>
-              <a:t>vous informerons </a:t>
-            </a:r>
-            <a:r>
-              <a:rPr lang="fr-FR" sz="2400" dirty="0" smtClean="0"/>
-              <a:t>donc </a:t>
-            </a:r>
-            <a:r>
-              <a:rPr lang="fr-FR" sz="2400" dirty="0"/>
-              <a:t>si votre prédiction était correcte ou non. </a:t>
-            </a:r>
-          </a:p>
-          <a:p>
-            <a:pPr algn="ctr"/>
-            <a:endParaRPr lang="fr-FR" sz="2400" dirty="0" smtClean="0"/>
-          </a:p>
-          <a:p>
-            <a:pPr algn="ctr"/>
-            <a:r>
-              <a:rPr lang="fr-FR" sz="2400" dirty="0" smtClean="0"/>
-              <a:t>Si </a:t>
-            </a:r>
-            <a:r>
-              <a:rPr lang="fr-FR" sz="2400" dirty="0"/>
-              <a:t>vous aviez raison, vous verrez sur l’écran </a:t>
-            </a:r>
-            <a:r>
-              <a:rPr lang="fr-FR" sz="2400" dirty="0" smtClean="0"/>
-              <a:t>:</a:t>
-            </a:r>
-          </a:p>
-          <a:p>
-            <a:pPr algn="ctr"/>
-            <a:r>
-              <a:rPr lang="fr-FR" sz="2400" dirty="0" smtClean="0">
-                <a:solidFill>
-                  <a:srgbClr val="00B050"/>
-                </a:solidFill>
-              </a:rPr>
-              <a:t>'Bien </a:t>
-            </a:r>
+              <a:rPr lang="fr-FR" sz="2400" dirty="0"/>
+              <a:t>Nous vous informerons donc si votre prédiction était correcte ou non. </a:t>
+            </a:r>
+          </a:p>
+          <a:p>
+            <a:pPr algn="ctr"/>
+            <a:endParaRPr lang="fr-FR" sz="2400" dirty="0"/>
+          </a:p>
+          <a:p>
+            <a:pPr algn="ctr"/>
+            <a:r>
+              <a:rPr lang="fr-FR" sz="2400" dirty="0"/>
+              <a:t>Si vous aviez raison, vous verrez sur l’écran :</a:t>
+            </a:r>
+          </a:p>
+          <a:p>
+            <a:pPr algn="ctr"/>
             <a:r>
               <a:rPr lang="fr-FR" sz="2400" dirty="0">
                 <a:solidFill>
                   <a:srgbClr val="00B050"/>
                 </a:solidFill>
               </a:rPr>
-              <a:t>joué! Il / Elle a effectivement choisi cette option</a:t>
-            </a:r>
-            <a:r>
-              <a:rPr lang="fr-FR" sz="2400" dirty="0" smtClean="0"/>
+              <a:t>'Bien joué! Il / Elle a effectivement choisi cette option</a:t>
+            </a:r>
+            <a:r>
+              <a:rPr lang="fr-FR" sz="2400" dirty="0"/>
               <a:t>´. </a:t>
             </a:r>
           </a:p>
           <a:p>
             <a:pPr algn="ctr"/>
-            <a:endParaRPr lang="fr-FR" sz="2400" dirty="0" smtClean="0"/>
-          </a:p>
-          <a:p>
-            <a:pPr algn="ctr"/>
-            <a:r>
-              <a:rPr lang="fr-FR" sz="2400" dirty="0" smtClean="0"/>
-              <a:t>Si </a:t>
-            </a:r>
-            <a:r>
-              <a:rPr lang="fr-FR" sz="2400" dirty="0"/>
-              <a:t>vous vous êtes trompé, vous verrez sur l’écran </a:t>
-            </a:r>
-            <a:r>
-              <a:rPr lang="fr-FR" sz="2400" dirty="0" smtClean="0"/>
-              <a:t>:</a:t>
-            </a:r>
-          </a:p>
-          <a:p>
-            <a:pPr algn="ctr"/>
-            <a:r>
-              <a:rPr lang="fr-FR" sz="2400" dirty="0" smtClean="0">
-                <a:solidFill>
-                  <a:srgbClr val="C00000"/>
-                </a:solidFill>
-              </a:rPr>
-              <a:t>'Désolé</a:t>
-            </a:r>
+            <a:endParaRPr lang="fr-FR" sz="2400" dirty="0"/>
+          </a:p>
+          <a:p>
+            <a:pPr algn="ctr"/>
+            <a:r>
+              <a:rPr lang="fr-FR" sz="2400" dirty="0"/>
+              <a:t>Si vous vous êtes trompé, vous verrez sur l’écran :</a:t>
+            </a:r>
+          </a:p>
+          <a:p>
+            <a:pPr algn="ctr"/>
             <a:r>
               <a:rPr lang="fr-FR" sz="2400" dirty="0">
                 <a:solidFill>
                   <a:srgbClr val="C00000"/>
                 </a:solidFill>
               </a:rPr>
-              <a:t>, il / elle a choisi l'autre option</a:t>
+              <a:t>'Désolé, il / elle a choisi l'autre option</a:t>
             </a:r>
             <a:r>
               <a:rPr lang="fr-FR" sz="2400" dirty="0"/>
@@ -8402,31 +7400,15 @@
             <a:pPr marL="0" indent="0" algn="just">
               <a:buNone/>
             </a:pPr>
-            <a:endParaRPr lang="fr-FR" sz="2400" dirty="0" smtClean="0"/>
+            <a:endParaRPr lang="fr-FR" sz="2400" dirty="0"/>
           </a:p>
           <a:p>
             <a:pPr marL="0" indent="0" algn="just">
               <a:buNone/>
             </a:pPr>
             <a:r>
-              <a:rPr lang="fr-FR" sz="2400" dirty="0" smtClean="0"/>
-              <a:t>	</a:t>
-            </a:r>
-            <a:r>
-              <a:rPr lang="fr-FR" sz="2400" dirty="0"/>
-              <a:t>	  </a:t>
-            </a:r>
-            <a:r>
-              <a:rPr lang="fr-FR" sz="2400" dirty="0" smtClean="0"/>
-              <a:t>    Garder </a:t>
-            </a:r>
-            <a:r>
-              <a:rPr lang="fr-FR" sz="2400" dirty="0"/>
-              <a:t>13 euros            </a:t>
-            </a:r>
-            <a:r>
-              <a:rPr lang="fr-FR" sz="2400" dirty="0" smtClean="0"/>
-              <a:t>vs. </a:t>
+              <a:rPr lang="fr-FR" sz="2400" dirty="0"/>
+              <a:t>		      Garder 13 euros            vs. </a:t>
             </a:r>
           </a:p>
           <a:p>
@@ -8539,13 +7521,6 @@
   <p:clrMapOvr>
     <a:masterClrMapping/>
   </p:clrMapOvr>
-  <p:timing>
-    <p:tnLst>
-      <p:par>
-        <p:cTn id="1" dur="indefinite" restart="never" nodeType="tmRoot"/>
-      </p:par>
-    </p:tnLst>
-  </p:timing>
 </p:sld>
 </file>
 
@@ -8592,34 +7567,9 @@
               <a:buNone/>
             </a:pPr>
             <a:r>
-              <a:rPr lang="fr-FR" sz="2400" dirty="0" smtClean="0"/>
-              <a:t>Pour certaines prédictions, nous </a:t>
-            </a:r>
-            <a:r>
-              <a:rPr lang="fr-FR" sz="2400" dirty="0"/>
-              <a:t>vous </a:t>
-            </a:r>
-            <a:r>
-              <a:rPr lang="fr-FR" sz="2400" dirty="0" smtClean="0"/>
-              <a:t>demanderons </a:t>
-            </a:r>
-            <a:r>
-              <a:rPr lang="fr-FR" sz="2400" dirty="0"/>
-              <a:t>d’exprimer votre degré de </a:t>
-            </a:r>
-            <a:r>
-              <a:rPr lang="fr-FR" sz="2400" dirty="0" smtClean="0"/>
-              <a:t>confiance </a:t>
-            </a:r>
-            <a:r>
-              <a:rPr lang="fr-FR" sz="2400" dirty="0"/>
-              <a:t>avant de vous dire si </a:t>
-            </a:r>
-            <a:r>
-              <a:rPr lang="fr-FR" sz="2400" dirty="0" smtClean="0"/>
-              <a:t>votre prédiction était correcte: </a:t>
-            </a:r>
-            <a:endParaRPr lang="fr-FR" sz="2400" dirty="0"/>
+              <a:rPr lang="fr-FR" sz="2400" dirty="0"/>
+              <a:t>Pour certaines prédictions, nous vous demanderons d’exprimer votre degré de confiance avant de vous dire si votre prédiction était correcte: </a:t>
+            </a:r>
           </a:p>
         </p:txBody>
       </p:sp>
@@ -8683,7 +7633,7 @@
           <a:p>
             <a:pPr algn="ctr"/>
             <a:r>
-              <a:rPr lang="fr-FR" sz="2400" b="1" dirty="0" smtClean="0">
+              <a:rPr lang="fr-FR" sz="2400" b="1" dirty="0">
                 <a:solidFill>
                   <a:srgbClr val="0070C0"/>
                 </a:solidFill>
@@ -8721,12 +7671,8 @@
           <a:p>
             <a:pPr algn="ctr"/>
             <a:r>
-              <a:rPr lang="fr-FR" sz="2400" dirty="0" smtClean="0"/>
-              <a:t>Pour </a:t>
-            </a:r>
-            <a:r>
-              <a:rPr lang="fr-FR" sz="2400" dirty="0"/>
-              <a:t>répondre, vous déplacerez le pointeur de la barre de défilement avec la souris.</a:t>
+              <a:rPr lang="fr-FR" sz="2400" dirty="0"/>
+              <a:t>Pour répondre, vous déplacerez le pointeur de la barre de défilement avec la souris.</a:t>
             </a:r>
           </a:p>
           <a:p>
@@ -8736,26 +7682,9 @@
           <a:p>
             <a:pPr algn="ctr"/>
             <a:r>
-              <a:rPr lang="fr-FR" sz="2400" dirty="0" smtClean="0"/>
-              <a:t>Attention: si </a:t>
-            </a:r>
-            <a:r>
-              <a:rPr lang="fr-FR" sz="2400" dirty="0"/>
-              <a:t>vous ne déplacez pas la </a:t>
-            </a:r>
-            <a:r>
-              <a:rPr lang="fr-FR" sz="2400" dirty="0" smtClean="0"/>
-              <a:t>barre, </a:t>
-            </a:r>
-            <a:r>
-              <a:rPr lang="fr-FR" sz="2400" dirty="0"/>
-              <a:t>vous ne pourrez pas </a:t>
-            </a:r>
-            <a:r>
-              <a:rPr lang="fr-FR" sz="2400" dirty="0" smtClean="0"/>
-              <a:t>continuer le test.</a:t>
-            </a:r>
-            <a:endParaRPr lang="fr-FR" sz="2400" dirty="0"/>
+              <a:rPr lang="fr-FR" sz="2400" dirty="0"/>
+              <a:t>Attention: si vous ne déplacez pas la barre, vous ne pourrez pas continuer le test.</a:t>
+            </a:r>
           </a:p>
         </p:txBody>
       </p:sp>
@@ -8769,13 +7698,6 @@
   <p:clrMapOvr>
     <a:masterClrMapping/>
   </p:clrMapOvr>
-  <p:timing>
-    <p:tnLst>
-      <p:par>
-        <p:cTn id="1" dur="indefinite" restart="never" nodeType="tmRoot"/>
-      </p:par>
-    </p:tnLst>
-  </p:timing>
 </p:sld>
 </file>
 

</xml_diff>

<commit_message>
changes in instruction ppt mod task DPD
</commit_message>
<xml_diff>
--- a/src/mod_DPD_task/stimuli/instructions/instructionsDPD.pptx
+++ b/src/mod_DPD_task/stimuli/instructions/instructionsDPD.pptx
@@ -3348,7 +3348,15 @@
             <a:pPr algn="ctr"/>
             <a:r>
               <a:rPr lang="fr-FR" sz="2400" dirty="0"/>
-              <a:t>Au total, le test comprends 4 phases de décision, et 3 phases de prédiction.</a:t>
+              <a:t>Au total, le test </a:t>
+            </a:r>
+            <a:r>
+              <a:rPr lang="fr-FR" sz="2400"/>
+              <a:t>comprends 4 </a:t>
+            </a:r>
+            <a:r>
+              <a:rPr lang="fr-FR" sz="2400" dirty="0"/>
+              <a:t>phases de décision, et 3 phases de prédiction.</a:t>
             </a:r>
           </a:p>
           <a:p>

</xml_diff>

<commit_message>
more changes to mod DPD task
</commit_message>
<xml_diff>
--- a/src/mod_DPD_task/stimuli/instructions/instructionsDPD.pptx
+++ b/src/mod_DPD_task/stimuli/instructions/instructionsDPD.pptx
@@ -4565,14 +4565,64 @@
       </p:sp>
       <p:sp>
         <p:nvSpPr>
-          <p:cNvPr id="4" name="Rectangle 3"/>
+          <p:cNvPr id="5" name="ZoneTexte 4"/>
+          <p:cNvSpPr txBox="1"/>
+          <p:nvPr/>
+        </p:nvSpPr>
+        <p:spPr>
+          <a:xfrm>
+            <a:off x="3565404" y="349649"/>
+            <a:ext cx="5061192" cy="461665"/>
+          </a:xfrm>
+          <a:prstGeom prst="rect">
+            <a:avLst/>
+          </a:prstGeom>
+          <a:noFill/>
+          <a:ln>
+            <a:noFill/>
+          </a:ln>
+        </p:spPr>
+        <p:txBody>
+          <a:bodyPr wrap="square" rtlCol="0" anchor="ctr">
+            <a:spAutoFit/>
+          </a:bodyPr>
+          <a:lstStyle/>
+          <a:p>
+            <a:pPr algn="ctr">
+              <a:spcBef>
+                <a:spcPts val="1800"/>
+              </a:spcBef>
+              <a:spcAft>
+                <a:spcPts val="1800"/>
+              </a:spcAft>
+            </a:pPr>
+            <a:r>
+              <a:rPr lang="en-GB" sz="2400" b="1" dirty="0">
+                <a:solidFill>
+                  <a:srgbClr val="0070C0"/>
+                </a:solidFill>
+              </a:rPr>
+              <a:t>FIN DU TEST DE COGNITION SOCIALE</a:t>
+            </a:r>
+          </a:p>
+        </p:txBody>
+      </p:sp>
+      <p:sp>
+        <p:nvSpPr>
+          <p:cNvPr id="6" name="Rectangle 3">
+            <a:extLst>
+              <a:ext uri="{FF2B5EF4-FFF2-40B4-BE49-F238E27FC236}">
+                <a16:creationId xmlns:a16="http://schemas.microsoft.com/office/drawing/2014/main" id="{B84B9E4F-DE8B-D249-8DA5-DA610F2CACBA}"/>
+              </a:ext>
+            </a:extLst>
+          </p:cNvPr>
           <p:cNvSpPr/>
           <p:nvPr/>
         </p:nvSpPr>
         <p:spPr>
           <a:xfrm>
-            <a:off x="4376460" y="6369919"/>
-            <a:ext cx="3381375" cy="400110"/>
+            <a:off x="3856192" y="6233684"/>
+            <a:ext cx="4521559" cy="400110"/>
           </a:xfrm>
           <a:prstGeom prst="rect">
             <a:avLst/>
@@ -4593,51 +4643,30 @@
                   </a:schemeClr>
                 </a:solidFill>
               </a:rPr>
-              <a:t>Appuyez sur [espace] pour finir</a:t>
-            </a:r>
-          </a:p>
-        </p:txBody>
-      </p:sp>
-      <p:sp>
-        <p:nvSpPr>
-          <p:cNvPr id="5" name="ZoneTexte 4"/>
-          <p:cNvSpPr txBox="1"/>
-          <p:nvPr/>
-        </p:nvSpPr>
-        <p:spPr>
-          <a:xfrm>
-            <a:off x="3565404" y="349649"/>
-            <a:ext cx="5061192" cy="461665"/>
-          </a:xfrm>
-          <a:prstGeom prst="rect">
-            <a:avLst/>
-          </a:prstGeom>
-          <a:noFill/>
-          <a:ln>
-            <a:noFill/>
-          </a:ln>
-        </p:spPr>
-        <p:txBody>
-          <a:bodyPr wrap="square" rtlCol="0" anchor="ctr">
-            <a:spAutoFit/>
-          </a:bodyPr>
-          <a:lstStyle/>
-          <a:p>
-            <a:pPr algn="ctr">
-              <a:spcBef>
-                <a:spcPts val="1800"/>
-              </a:spcBef>
-              <a:spcAft>
-                <a:spcPts val="1800"/>
-              </a:spcAft>
-            </a:pPr>
-            <a:r>
-              <a:rPr lang="en-GB" sz="2400" b="1" dirty="0">
+              <a:t>Appuyez sur la flèche droite [</a:t>
+            </a:r>
+            <a:r>
+              <a:rPr lang="fr-FR" sz="2000" i="1" dirty="0">
                 <a:solidFill>
-                  <a:srgbClr val="0070C0"/>
+                  <a:schemeClr val="tx1">
+                    <a:lumMod val="50000"/>
+                    <a:lumOff val="50000"/>
+                  </a:schemeClr>
+                </a:solidFill>
+                <a:sym typeface="Wingdings" pitchFamily="2" charset="2"/>
+              </a:rPr>
+              <a:t></a:t>
+            </a:r>
+            <a:r>
+              <a:rPr lang="fr-FR" sz="2000" i="1" dirty="0">
+                <a:solidFill>
+                  <a:schemeClr val="tx1">
+                    <a:lumMod val="50000"/>
+                    <a:lumOff val="50000"/>
+                  </a:schemeClr>
                 </a:solidFill>
               </a:rPr>
-              <a:t>FIN DU TEST DE COGNITION SOCIALE</a:t>
+              <a:t>] pour finir</a:t>
             </a:r>
           </a:p>
         </p:txBody>

</xml_diff>